<commit_message>
slides and tensorboard images
</commit_message>
<xml_diff>
--- a/project_report/Colin Leach project for ASTR 502.pptx
+++ b/project_report/Colin Leach project for ASTR 502.pptx
@@ -5,18 +5,23 @@
     <p:sldMasterId id="2147483648" r:id="rId1"/>
   </p:sldMasterIdLst>
   <p:notesMasterIdLst>
-    <p:notesMasterId r:id="rId8"/>
+    <p:notesMasterId r:id="rId13"/>
   </p:notesMasterIdLst>
   <p:handoutMasterIdLst>
-    <p:handoutMasterId r:id="rId9"/>
+    <p:handoutMasterId r:id="rId14"/>
   </p:handoutMasterIdLst>
   <p:sldIdLst>
     <p:sldId id="256" r:id="rId2"/>
-    <p:sldId id="258" r:id="rId3"/>
-    <p:sldId id="257" r:id="rId4"/>
-    <p:sldId id="259" r:id="rId5"/>
-    <p:sldId id="260" r:id="rId6"/>
-    <p:sldId id="261" r:id="rId7"/>
+    <p:sldId id="262" r:id="rId3"/>
+    <p:sldId id="258" r:id="rId4"/>
+    <p:sldId id="257" r:id="rId5"/>
+    <p:sldId id="259" r:id="rId6"/>
+    <p:sldId id="260" r:id="rId7"/>
+    <p:sldId id="261" r:id="rId8"/>
+    <p:sldId id="263" r:id="rId9"/>
+    <p:sldId id="264" r:id="rId10"/>
+    <p:sldId id="265" r:id="rId11"/>
+    <p:sldId id="266" r:id="rId12"/>
   </p:sldIdLst>
   <p:sldSz cx="12192000" cy="6858000"/>
   <p:notesSz cx="6858000" cy="9144000"/>
@@ -115,6 +120,14 @@
       </a:defRPr>
     </a:lvl9pPr>
   </p:defaultTextStyle>
+  <p:extLst>
+    <p:ext uri="{EFAFB233-063F-42B5-8137-9DF3F51BA10A}">
+      <p15:sldGuideLst xmlns:p15="http://schemas.microsoft.com/office/powerpoint/2012/main"/>
+    </p:ext>
+    <p:ext uri="{2D200454-40CA-4A62-9FC3-DE9A4176ACB9}">
+      <p15:notesGuideLst xmlns:p15="http://schemas.microsoft.com/office/powerpoint/2012/main"/>
+    </p:ext>
+  </p:extLst>
 </p:presentation>
 </file>
 
@@ -212,7 +225,7 @@
           <a:p>
             <a:fld id="{48B81B2D-A7DC-444B-B83F-9D1FE7F2F7DF}" type="datetimeFigureOut">
               <a:rPr lang="en-US" smtClean="0"/>
-              <a:t>4/2/2022</a:t>
+              <a:t>4/5/2022</a:t>
             </a:fld>
             <a:endParaRPr lang="en-US"/>
           </a:p>
@@ -389,7 +402,7 @@
           <a:p>
             <a:fld id="{41186275-BB08-45AC-B471-1F1BC4E56FF5}" type="datetimeFigureOut">
               <a:rPr lang="en-US" smtClean="0"/>
-              <a:t>4/2/2022</a:t>
+              <a:t>4/5/2022</a:t>
             </a:fld>
             <a:endParaRPr lang="en-US"/>
           </a:p>
@@ -811,7 +824,7 @@
           <a:p>
             <a:fld id="{B2A86782-D016-47D1-B107-32193C739C08}" type="datetimeFigureOut">
               <a:rPr lang="en-US" smtClean="0"/>
-              <a:t>4/2/2022</a:t>
+              <a:t>4/5/2022</a:t>
             </a:fld>
             <a:endParaRPr lang="en-US"/>
           </a:p>
@@ -1025,7 +1038,7 @@
           <a:p>
             <a:fld id="{B2A86782-D016-47D1-B107-32193C739C08}" type="datetimeFigureOut">
               <a:rPr lang="en-US" smtClean="0"/>
-              <a:t>4/2/2022</a:t>
+              <a:t>4/5/2022</a:t>
             </a:fld>
             <a:endParaRPr lang="en-US"/>
           </a:p>
@@ -1249,7 +1262,7 @@
           <a:p>
             <a:fld id="{B2A86782-D016-47D1-B107-32193C739C08}" type="datetimeFigureOut">
               <a:rPr lang="en-US" smtClean="0"/>
-              <a:t>4/2/2022</a:t>
+              <a:t>4/5/2022</a:t>
             </a:fld>
             <a:endParaRPr lang="en-US"/>
           </a:p>
@@ -1709,7 +1722,7 @@
           <a:p>
             <a:fld id="{B2A86782-D016-47D1-B107-32193C739C08}" type="datetimeFigureOut">
               <a:rPr lang="en-US" smtClean="0"/>
-              <a:t>4/2/2022</a:t>
+              <a:t>4/5/2022</a:t>
             </a:fld>
             <a:endParaRPr lang="en-US"/>
           </a:p>
@@ -1990,7 +2003,7 @@
           <a:p>
             <a:fld id="{B2A86782-D016-47D1-B107-32193C739C08}" type="datetimeFigureOut">
               <a:rPr lang="en-US" smtClean="0"/>
-              <a:t>4/2/2022</a:t>
+              <a:t>4/5/2022</a:t>
             </a:fld>
             <a:endParaRPr lang="en-US"/>
           </a:p>
@@ -2418,7 +2431,7 @@
           <a:p>
             <a:fld id="{B2A86782-D016-47D1-B107-32193C739C08}" type="datetimeFigureOut">
               <a:rPr lang="en-US" smtClean="0"/>
-              <a:t>4/2/2022</a:t>
+              <a:t>4/5/2022</a:t>
             </a:fld>
             <a:endParaRPr lang="en-US"/>
           </a:p>
@@ -2575,7 +2588,7 @@
           <a:p>
             <a:fld id="{B2A86782-D016-47D1-B107-32193C739C08}" type="datetimeFigureOut">
               <a:rPr lang="en-US" smtClean="0"/>
-              <a:t>4/2/2022</a:t>
+              <a:t>4/5/2022</a:t>
             </a:fld>
             <a:endParaRPr lang="en-US"/>
           </a:p>
@@ -2704,7 +2717,7 @@
           <a:p>
             <a:fld id="{B2A86782-D016-47D1-B107-32193C739C08}" type="datetimeFigureOut">
               <a:rPr lang="en-US" smtClean="0"/>
-              <a:t>4/2/2022</a:t>
+              <a:t>4/5/2022</a:t>
             </a:fld>
             <a:endParaRPr lang="en-US"/>
           </a:p>
@@ -3031,7 +3044,7 @@
           <a:p>
             <a:fld id="{B2A86782-D016-47D1-B107-32193C739C08}" type="datetimeFigureOut">
               <a:rPr lang="en-US" smtClean="0"/>
-              <a:t>4/2/2022</a:t>
+              <a:t>4/5/2022</a:t>
             </a:fld>
             <a:endParaRPr lang="en-US"/>
           </a:p>
@@ -3335,7 +3348,7 @@
           <a:p>
             <a:fld id="{B2A86782-D016-47D1-B107-32193C739C08}" type="datetimeFigureOut">
               <a:rPr lang="en-US" smtClean="0"/>
-              <a:t>4/2/2022</a:t>
+              <a:t>4/5/2022</a:t>
             </a:fld>
             <a:endParaRPr lang="en-US"/>
           </a:p>
@@ -3987,6 +4000,172 @@
 </p:sld>
 </file>
 
+<file path=ppt/slides/slide10.xml><?xml version="1.0" encoding="utf-8"?>
+<p:sld xmlns:a="http://schemas.openxmlformats.org/drawingml/2006/main" xmlns:r="http://schemas.openxmlformats.org/officeDocument/2006/relationships" xmlns:p="http://schemas.openxmlformats.org/presentationml/2006/main">
+  <p:cSld>
+    <p:spTree>
+      <p:nvGrpSpPr>
+        <p:cNvPr id="1" name=""/>
+        <p:cNvGrpSpPr/>
+        <p:nvPr/>
+      </p:nvGrpSpPr>
+      <p:grpSpPr>
+        <a:xfrm>
+          <a:off x="0" y="0"/>
+          <a:ext cx="0" cy="0"/>
+          <a:chOff x="0" y="0"/>
+          <a:chExt cx="0" cy="0"/>
+        </a:xfrm>
+      </p:grpSpPr>
+      <p:sp>
+        <p:nvSpPr>
+          <p:cNvPr id="2" name="Title 1">
+            <a:extLst>
+              <a:ext uri="{FF2B5EF4-FFF2-40B4-BE49-F238E27FC236}">
+                <a16:creationId xmlns:a16="http://schemas.microsoft.com/office/drawing/2014/main" id="{274CC1EF-3769-4D75-ACF1-18E846173CDD}"/>
+              </a:ext>
+            </a:extLst>
+          </p:cNvPr>
+          <p:cNvSpPr>
+            <a:spLocks noGrp="1"/>
+          </p:cNvSpPr>
+          <p:nvPr>
+            <p:ph type="title"/>
+          </p:nvPr>
+        </p:nvSpPr>
+        <p:spPr/>
+        <p:txBody>
+          <a:bodyPr/>
+          <a:lstStyle/>
+          <a:p>
+            <a:r>
+              <a:rPr lang="en-US" dirty="0"/>
+              <a:t>Predictions</a:t>
+            </a:r>
+          </a:p>
+        </p:txBody>
+      </p:sp>
+      <p:sp>
+        <p:nvSpPr>
+          <p:cNvPr id="3" name="Content Placeholder 2">
+            <a:extLst>
+              <a:ext uri="{FF2B5EF4-FFF2-40B4-BE49-F238E27FC236}">
+                <a16:creationId xmlns:a16="http://schemas.microsoft.com/office/drawing/2014/main" id="{67257409-C81E-4F98-A98C-7F542C8828D6}"/>
+              </a:ext>
+            </a:extLst>
+          </p:cNvPr>
+          <p:cNvSpPr>
+            <a:spLocks noGrp="1"/>
+          </p:cNvSpPr>
+          <p:nvPr>
+            <p:ph idx="1"/>
+          </p:nvPr>
+        </p:nvSpPr>
+        <p:spPr/>
+        <p:txBody>
+          <a:bodyPr/>
+          <a:lstStyle/>
+          <a:p>
+            <a:endParaRPr lang="en-US"/>
+          </a:p>
+        </p:txBody>
+      </p:sp>
+    </p:spTree>
+    <p:extLst>
+      <p:ext uri="{BB962C8B-B14F-4D97-AF65-F5344CB8AC3E}">
+        <p14:creationId xmlns:p14="http://schemas.microsoft.com/office/powerpoint/2010/main" val="4235212135"/>
+      </p:ext>
+    </p:extLst>
+  </p:cSld>
+  <p:clrMapOvr>
+    <a:masterClrMapping/>
+  </p:clrMapOvr>
+</p:sld>
+</file>
+
+<file path=ppt/slides/slide11.xml><?xml version="1.0" encoding="utf-8"?>
+<p:sld xmlns:a="http://schemas.openxmlformats.org/drawingml/2006/main" xmlns:r="http://schemas.openxmlformats.org/officeDocument/2006/relationships" xmlns:p="http://schemas.openxmlformats.org/presentationml/2006/main">
+  <p:cSld>
+    <p:spTree>
+      <p:nvGrpSpPr>
+        <p:cNvPr id="1" name=""/>
+        <p:cNvGrpSpPr/>
+        <p:nvPr/>
+      </p:nvGrpSpPr>
+      <p:grpSpPr>
+        <a:xfrm>
+          <a:off x="0" y="0"/>
+          <a:ext cx="0" cy="0"/>
+          <a:chOff x="0" y="0"/>
+          <a:chExt cx="0" cy="0"/>
+        </a:xfrm>
+      </p:grpSpPr>
+      <p:sp>
+        <p:nvSpPr>
+          <p:cNvPr id="2" name="Title 1">
+            <a:extLst>
+              <a:ext uri="{FF2B5EF4-FFF2-40B4-BE49-F238E27FC236}">
+                <a16:creationId xmlns:a16="http://schemas.microsoft.com/office/drawing/2014/main" id="{ED30217E-1988-454C-B069-2B5837E8DC3B}"/>
+              </a:ext>
+            </a:extLst>
+          </p:cNvPr>
+          <p:cNvSpPr>
+            <a:spLocks noGrp="1"/>
+          </p:cNvSpPr>
+          <p:nvPr>
+            <p:ph type="title"/>
+          </p:nvPr>
+        </p:nvSpPr>
+        <p:spPr/>
+        <p:txBody>
+          <a:bodyPr/>
+          <a:lstStyle/>
+          <a:p>
+            <a:r>
+              <a:rPr lang="en-US" dirty="0"/>
+              <a:t>Still To Do…</a:t>
+            </a:r>
+          </a:p>
+        </p:txBody>
+      </p:sp>
+      <p:sp>
+        <p:nvSpPr>
+          <p:cNvPr id="7" name="Content Placeholder 6">
+            <a:extLst>
+              <a:ext uri="{FF2B5EF4-FFF2-40B4-BE49-F238E27FC236}">
+                <a16:creationId xmlns:a16="http://schemas.microsoft.com/office/drawing/2014/main" id="{ECEE2BAE-F56A-4770-902B-94547F884D8E}"/>
+              </a:ext>
+            </a:extLst>
+          </p:cNvPr>
+          <p:cNvSpPr>
+            <a:spLocks noGrp="1"/>
+          </p:cNvSpPr>
+          <p:nvPr>
+            <p:ph idx="1"/>
+          </p:nvPr>
+        </p:nvSpPr>
+        <p:spPr/>
+        <p:txBody>
+          <a:bodyPr/>
+          <a:lstStyle/>
+          <a:p>
+            <a:endParaRPr lang="en-US"/>
+          </a:p>
+        </p:txBody>
+      </p:sp>
+    </p:spTree>
+    <p:extLst>
+      <p:ext uri="{BB962C8B-B14F-4D97-AF65-F5344CB8AC3E}">
+        <p14:creationId xmlns:p14="http://schemas.microsoft.com/office/powerpoint/2010/main" val="2934519682"/>
+      </p:ext>
+    </p:extLst>
+  </p:cSld>
+  <p:clrMapOvr>
+    <a:masterClrMapping/>
+  </p:clrMapOvr>
+</p:sld>
+</file>
+
 <file path=ppt/slides/slide2.xml><?xml version="1.0" encoding="utf-8"?>
 <p:sld xmlns:a="http://schemas.openxmlformats.org/drawingml/2006/main" xmlns:r="http://schemas.openxmlformats.org/officeDocument/2006/relationships" xmlns:p="http://schemas.openxmlformats.org/presentationml/2006/main">
   <p:cSld>
@@ -4004,47 +4183,12 @@
           <a:chExt cx="0" cy="0"/>
         </a:xfrm>
       </p:grpSpPr>
-      <p:pic>
-        <p:nvPicPr>
-          <p:cNvPr id="5" name="Picture 4">
-            <a:extLst>
-              <a:ext uri="{FF2B5EF4-FFF2-40B4-BE49-F238E27FC236}">
-                <a16:creationId xmlns:a16="http://schemas.microsoft.com/office/drawing/2014/main" id="{5AC08312-1A6F-4B93-BD19-00A916C04895}"/>
-              </a:ext>
-            </a:extLst>
-          </p:cNvPr>
-          <p:cNvPicPr>
-            <a:picLocks noChangeAspect="1"/>
-          </p:cNvPicPr>
-          <p:nvPr/>
-        </p:nvPicPr>
-        <p:blipFill>
-          <a:blip r:embed="rId2"/>
-          <a:stretch>
-            <a:fillRect/>
-          </a:stretch>
-        </p:blipFill>
-        <p:spPr>
-          <a:xfrm>
-            <a:off x="489354" y="1216980"/>
-            <a:ext cx="7716327" cy="2286319"/>
-          </a:xfrm>
-          <a:prstGeom prst="rect">
-            <a:avLst/>
-          </a:prstGeom>
-          <a:ln>
-            <a:solidFill>
-              <a:schemeClr val="accent1"/>
-            </a:solidFill>
-          </a:ln>
-        </p:spPr>
-      </p:pic>
-      <p:sp>
-        <p:nvSpPr>
-          <p:cNvPr id="6" name="Title 1">
-            <a:extLst>
-              <a:ext uri="{FF2B5EF4-FFF2-40B4-BE49-F238E27FC236}">
-                <a16:creationId xmlns:a16="http://schemas.microsoft.com/office/drawing/2014/main" id="{A277E114-6B85-436B-81E4-A9A9CD31F3B9}"/>
+      <p:sp>
+        <p:nvSpPr>
+          <p:cNvPr id="2" name="Title 1">
+            <a:extLst>
+              <a:ext uri="{FF2B5EF4-FFF2-40B4-BE49-F238E27FC236}">
+                <a16:creationId xmlns:a16="http://schemas.microsoft.com/office/drawing/2014/main" id="{1399B9DE-9850-4D24-8BFC-7502398BD542}"/>
               </a:ext>
             </a:extLst>
           </p:cNvPr>
@@ -4055,282 +4199,131 @@
             <p:ph type="title"/>
           </p:nvPr>
         </p:nvSpPr>
-        <p:spPr>
-          <a:xfrm>
-            <a:off x="838200" y="365126"/>
-            <a:ext cx="10515600" cy="611058"/>
-          </a:xfrm>
-        </p:spPr>
-        <p:txBody>
-          <a:bodyPr>
-            <a:noAutofit/>
-          </a:bodyPr>
-          <a:lstStyle/>
-          <a:p>
-            <a:pPr algn="ctr"/>
-            <a:r>
-              <a:rPr lang="en-US" sz="4000" b="1" dirty="0"/>
-              <a:t>Papers</a:t>
-            </a:r>
-          </a:p>
-        </p:txBody>
-      </p:sp>
-      <p:pic>
-        <p:nvPicPr>
-          <p:cNvPr id="8" name="Picture 7">
-            <a:extLst>
-              <a:ext uri="{FF2B5EF4-FFF2-40B4-BE49-F238E27FC236}">
-                <a16:creationId xmlns:a16="http://schemas.microsoft.com/office/drawing/2014/main" id="{936942D8-57D2-4A81-9959-FEAD149F4775}"/>
-              </a:ext>
-            </a:extLst>
-          </p:cNvPr>
-          <p:cNvPicPr>
-            <a:picLocks noChangeAspect="1"/>
-          </p:cNvPicPr>
-          <p:nvPr/>
-        </p:nvPicPr>
-        <p:blipFill>
-          <a:blip r:embed="rId3"/>
-          <a:stretch>
-            <a:fillRect/>
-          </a:stretch>
-        </p:blipFill>
-        <p:spPr>
-          <a:xfrm>
-            <a:off x="568946" y="4062108"/>
-            <a:ext cx="7087589" cy="2514951"/>
-          </a:xfrm>
-          <a:prstGeom prst="rect">
-            <a:avLst/>
-          </a:prstGeom>
-          <a:ln>
-            <a:solidFill>
-              <a:schemeClr val="accent1"/>
-            </a:solidFill>
-          </a:ln>
-        </p:spPr>
-      </p:pic>
-      <p:sp>
-        <p:nvSpPr>
-          <p:cNvPr id="9" name="TextBox 8">
-            <a:extLst>
-              <a:ext uri="{FF2B5EF4-FFF2-40B4-BE49-F238E27FC236}">
-                <a16:creationId xmlns:a16="http://schemas.microsoft.com/office/drawing/2014/main" id="{86397049-D502-45B6-BFA7-72406DF734F2}"/>
-              </a:ext>
-            </a:extLst>
-          </p:cNvPr>
-          <p:cNvSpPr txBox="1"/>
-          <p:nvPr/>
-        </p:nvSpPr>
-        <p:spPr>
-          <a:xfrm>
-            <a:off x="8544697" y="1219704"/>
-            <a:ext cx="3312125" cy="1200329"/>
-          </a:xfrm>
-          <a:prstGeom prst="rect">
-            <a:avLst/>
-          </a:prstGeom>
-          <a:noFill/>
-        </p:spPr>
-        <p:txBody>
-          <a:bodyPr wrap="none" rtlCol="0">
-            <a:spAutoFit/>
-          </a:bodyPr>
-          <a:lstStyle/>
-          <a:p>
-            <a:r>
-              <a:rPr lang="en-US" sz="2400" dirty="0">
-                <a:solidFill>
-                  <a:srgbClr val="002060"/>
-                </a:solidFill>
-              </a:rPr>
-              <a:t>MNRAS </a:t>
-            </a:r>
-            <a:r>
-              <a:rPr lang="en-US" sz="2400" b="1" dirty="0">
-                <a:solidFill>
-                  <a:srgbClr val="002060"/>
-                </a:solidFill>
-              </a:rPr>
-              <a:t>491</a:t>
-            </a:r>
-            <a:r>
-              <a:rPr lang="en-US" sz="2400" dirty="0">
-                <a:solidFill>
-                  <a:srgbClr val="002060"/>
-                </a:solidFill>
-              </a:rPr>
-              <a:t>, 1554 (2020)</a:t>
-            </a:r>
-          </a:p>
-          <a:p>
-            <a:endParaRPr lang="en-US" sz="2400" dirty="0">
-              <a:solidFill>
-                <a:srgbClr val="002060"/>
-              </a:solidFill>
-            </a:endParaRPr>
-          </a:p>
-          <a:p>
-            <a:r>
-              <a:rPr lang="en-US" sz="2400" dirty="0">
-                <a:solidFill>
-                  <a:srgbClr val="002060"/>
-                </a:solidFill>
-              </a:rPr>
-              <a:t>(W+20)</a:t>
-            </a:r>
-          </a:p>
-        </p:txBody>
-      </p:sp>
-      <p:sp>
-        <p:nvSpPr>
-          <p:cNvPr id="10" name="TextBox 9">
-            <a:extLst>
-              <a:ext uri="{FF2B5EF4-FFF2-40B4-BE49-F238E27FC236}">
-                <a16:creationId xmlns:a16="http://schemas.microsoft.com/office/drawing/2014/main" id="{6A786D2E-EB24-493F-BBBF-E957000CEC1E}"/>
-              </a:ext>
-            </a:extLst>
-          </p:cNvPr>
-          <p:cNvSpPr txBox="1"/>
-          <p:nvPr/>
-        </p:nvSpPr>
-        <p:spPr>
-          <a:xfrm>
-            <a:off x="8443619" y="4062108"/>
-            <a:ext cx="3312125" cy="1200329"/>
-          </a:xfrm>
-          <a:prstGeom prst="rect">
-            <a:avLst/>
-          </a:prstGeom>
-          <a:noFill/>
-        </p:spPr>
-        <p:txBody>
-          <a:bodyPr wrap="none" rtlCol="0">
-            <a:spAutoFit/>
-          </a:bodyPr>
-          <a:lstStyle/>
-          <a:p>
-            <a:r>
-              <a:rPr lang="en-US" sz="2400" dirty="0">
-                <a:solidFill>
-                  <a:srgbClr val="002060"/>
-                </a:solidFill>
-              </a:rPr>
-              <a:t>MNRAS </a:t>
-            </a:r>
-            <a:r>
-              <a:rPr lang="en-US" sz="2400" b="1" dirty="0">
-                <a:solidFill>
-                  <a:srgbClr val="002060"/>
-                </a:solidFill>
-              </a:rPr>
-              <a:t>509</a:t>
-            </a:r>
-            <a:r>
-              <a:rPr lang="en-US" sz="2400" dirty="0">
-                <a:solidFill>
-                  <a:srgbClr val="002060"/>
-                </a:solidFill>
-              </a:rPr>
-              <a:t>, 3966 (2021)</a:t>
-            </a:r>
-          </a:p>
-          <a:p>
-            <a:endParaRPr lang="en-US" sz="2400" dirty="0">
-              <a:solidFill>
-                <a:srgbClr val="002060"/>
-              </a:solidFill>
-            </a:endParaRPr>
-          </a:p>
-          <a:p>
-            <a:r>
-              <a:rPr lang="en-US" sz="2400" dirty="0">
-                <a:solidFill>
-                  <a:srgbClr val="002060"/>
-                </a:solidFill>
-              </a:rPr>
-              <a:t>(W+21)</a:t>
-            </a:r>
-          </a:p>
-        </p:txBody>
-      </p:sp>
-      <p:sp>
-        <p:nvSpPr>
-          <p:cNvPr id="11" name="TextBox 10">
-            <a:extLst>
-              <a:ext uri="{FF2B5EF4-FFF2-40B4-BE49-F238E27FC236}">
-                <a16:creationId xmlns:a16="http://schemas.microsoft.com/office/drawing/2014/main" id="{7BF2819D-CE34-4683-A78D-F53B0C1B351D}"/>
-              </a:ext>
-            </a:extLst>
-          </p:cNvPr>
-          <p:cNvSpPr txBox="1"/>
-          <p:nvPr/>
-        </p:nvSpPr>
-        <p:spPr>
-          <a:xfrm>
-            <a:off x="8443619" y="5641911"/>
-            <a:ext cx="3211047" cy="707886"/>
-          </a:xfrm>
-          <a:prstGeom prst="rect">
-            <a:avLst/>
-          </a:prstGeom>
-          <a:noFill/>
-        </p:spPr>
-        <p:txBody>
-          <a:bodyPr wrap="square" rtlCol="0">
-            <a:spAutoFit/>
-          </a:bodyPr>
-          <a:lstStyle/>
-          <a:p>
-            <a:r>
-              <a:rPr lang="en-US" sz="2000" i="1" dirty="0">
-                <a:solidFill>
-                  <a:srgbClr val="FF0000"/>
-                </a:solidFill>
-              </a:rPr>
-              <a:t>Better methods, better code, much better documentation</a:t>
-            </a:r>
-          </a:p>
-        </p:txBody>
-      </p:sp>
-      <p:sp>
-        <p:nvSpPr>
-          <p:cNvPr id="15" name="Slide Number Placeholder 3">
-            <a:extLst>
-              <a:ext uri="{FF2B5EF4-FFF2-40B4-BE49-F238E27FC236}">
-                <a16:creationId xmlns:a16="http://schemas.microsoft.com/office/drawing/2014/main" id="{E5F9CDD4-0A2F-4D4F-B10F-DCAF4DB05B08}"/>
-              </a:ext>
-            </a:extLst>
-          </p:cNvPr>
-          <p:cNvSpPr>
-            <a:spLocks noGrp="1"/>
-          </p:cNvSpPr>
-          <p:nvPr>
-            <p:ph type="sldNum" sz="quarter" idx="12"/>
-          </p:nvPr>
-        </p:nvSpPr>
-        <p:spPr>
-          <a:xfrm>
-            <a:off x="9321114" y="6399598"/>
-            <a:ext cx="2743200" cy="365125"/>
-          </a:xfrm>
-        </p:spPr>
+        <p:spPr/>
         <p:txBody>
           <a:bodyPr/>
           <a:lstStyle/>
           <a:p>
-            <a:fld id="{0F279EFA-F838-4CBF-8D1B-AFE8783F1096}" type="slidenum">
-              <a:rPr lang="en-US" sz="1400" b="1" smtClean="0"/>
-              <a:t>2</a:t>
-            </a:fld>
-            <a:endParaRPr lang="en-US" sz="1400" b="1" dirty="0"/>
+            <a:r>
+              <a:rPr lang="en-US" dirty="0"/>
+              <a:t>Why?</a:t>
+            </a:r>
+          </a:p>
+        </p:txBody>
+      </p:sp>
+      <p:sp>
+        <p:nvSpPr>
+          <p:cNvPr id="3" name="Content Placeholder 2">
+            <a:extLst>
+              <a:ext uri="{FF2B5EF4-FFF2-40B4-BE49-F238E27FC236}">
+                <a16:creationId xmlns:a16="http://schemas.microsoft.com/office/drawing/2014/main" id="{FAA93CAD-A24E-4299-91FA-9302EAE16661}"/>
+              </a:ext>
+            </a:extLst>
+          </p:cNvPr>
+          <p:cNvSpPr>
+            <a:spLocks noGrp="1"/>
+          </p:cNvSpPr>
+          <p:nvPr>
+            <p:ph idx="1"/>
+          </p:nvPr>
+        </p:nvSpPr>
+        <p:spPr>
+          <a:xfrm>
+            <a:off x="838200" y="1346886"/>
+            <a:ext cx="10515600" cy="4830077"/>
+          </a:xfrm>
+        </p:spPr>
+        <p:txBody>
+          <a:bodyPr/>
+          <a:lstStyle/>
+          <a:p>
+            <a:pPr marL="0" indent="0">
+              <a:buNone/>
+            </a:pPr>
+            <a:r>
+              <a:rPr lang="en-US" b="1" dirty="0"/>
+              <a:t>Rapid growth in survey data, static number of astronomers</a:t>
+            </a:r>
+          </a:p>
+          <a:p>
+            <a:pPr lvl="1"/>
+            <a:r>
+              <a:rPr lang="en-US" dirty="0"/>
+              <a:t>Citizen Science helped fill the gap over the last 20 years</a:t>
+            </a:r>
+          </a:p>
+          <a:p>
+            <a:pPr lvl="1"/>
+            <a:r>
+              <a:rPr lang="en-US" dirty="0"/>
+              <a:t>Sufficient for SDSS, will struggle with DES, Rubin, </a:t>
+            </a:r>
+            <a:r>
+              <a:rPr lang="en-US" dirty="0" err="1"/>
+              <a:t>etc</a:t>
+            </a:r>
+            <a:endParaRPr lang="en-US" dirty="0"/>
+          </a:p>
+          <a:p>
+            <a:pPr lvl="1"/>
+            <a:r>
+              <a:rPr lang="en-US" dirty="0"/>
+              <a:t>Need to use machines for a first-pass analysis</a:t>
+            </a:r>
+          </a:p>
+          <a:p>
+            <a:pPr lvl="1"/>
+            <a:r>
+              <a:rPr lang="en-US" dirty="0"/>
+              <a:t>Save humans for analyzing the difficult cases</a:t>
+            </a:r>
+          </a:p>
+          <a:p>
+            <a:pPr marL="0" indent="0">
+              <a:spcBef>
+                <a:spcPts val="3000"/>
+              </a:spcBef>
+              <a:buNone/>
+            </a:pPr>
+            <a:r>
+              <a:rPr lang="en-US" b="1" dirty="0"/>
+              <a:t>Make machine learning more efficient</a:t>
+            </a:r>
+          </a:p>
+          <a:p>
+            <a:pPr lvl="1"/>
+            <a:r>
+              <a:rPr lang="en-US" dirty="0"/>
+              <a:t>Galaxy Zoo has already classified &gt;250k galaxy images</a:t>
+            </a:r>
+          </a:p>
+          <a:p>
+            <a:pPr lvl="1"/>
+            <a:r>
+              <a:rPr lang="en-US" dirty="0"/>
+              <a:t>This work created pre-trained CNN models for these</a:t>
+            </a:r>
+          </a:p>
+          <a:p>
+            <a:pPr lvl="1"/>
+            <a:r>
+              <a:rPr lang="en-US" dirty="0"/>
+              <a:t>A better starting point than ImageNet for new surveys!</a:t>
+            </a:r>
+          </a:p>
+          <a:p>
+            <a:pPr lvl="1"/>
+            <a:r>
+              <a:rPr lang="en-US" dirty="0"/>
+              <a:t>Hope to train a new survey on far fewer human classifications</a:t>
+            </a:r>
           </a:p>
         </p:txBody>
       </p:sp>
     </p:spTree>
     <p:extLst>
       <p:ext uri="{BB962C8B-B14F-4D97-AF65-F5344CB8AC3E}">
-        <p14:creationId xmlns:p14="http://schemas.microsoft.com/office/powerpoint/2010/main" val="688114331"/>
+        <p14:creationId xmlns:p14="http://schemas.microsoft.com/office/powerpoint/2010/main" val="466959899"/>
       </p:ext>
     </p:extLst>
   </p:cSld>
@@ -4357,12 +4350,47 @@
           <a:chExt cx="0" cy="0"/>
         </a:xfrm>
       </p:grpSpPr>
-      <p:sp>
-        <p:nvSpPr>
-          <p:cNvPr id="2" name="Title 1">
-            <a:extLst>
-              <a:ext uri="{FF2B5EF4-FFF2-40B4-BE49-F238E27FC236}">
-                <a16:creationId xmlns:a16="http://schemas.microsoft.com/office/drawing/2014/main" id="{53555D55-9F12-4F72-A480-57881EF1D6BF}"/>
+      <p:pic>
+        <p:nvPicPr>
+          <p:cNvPr id="5" name="Picture 4">
+            <a:extLst>
+              <a:ext uri="{FF2B5EF4-FFF2-40B4-BE49-F238E27FC236}">
+                <a16:creationId xmlns:a16="http://schemas.microsoft.com/office/drawing/2014/main" id="{5AC08312-1A6F-4B93-BD19-00A916C04895}"/>
+              </a:ext>
+            </a:extLst>
+          </p:cNvPr>
+          <p:cNvPicPr>
+            <a:picLocks noChangeAspect="1"/>
+          </p:cNvPicPr>
+          <p:nvPr/>
+        </p:nvPicPr>
+        <p:blipFill>
+          <a:blip r:embed="rId2"/>
+          <a:stretch>
+            <a:fillRect/>
+          </a:stretch>
+        </p:blipFill>
+        <p:spPr>
+          <a:xfrm>
+            <a:off x="489354" y="1216980"/>
+            <a:ext cx="7716327" cy="2286319"/>
+          </a:xfrm>
+          <a:prstGeom prst="rect">
+            <a:avLst/>
+          </a:prstGeom>
+          <a:ln>
+            <a:solidFill>
+              <a:schemeClr val="accent1"/>
+            </a:solidFill>
+          </a:ln>
+        </p:spPr>
+      </p:pic>
+      <p:sp>
+        <p:nvSpPr>
+          <p:cNvPr id="6" name="Title 1">
+            <a:extLst>
+              <a:ext uri="{FF2B5EF4-FFF2-40B4-BE49-F238E27FC236}">
+                <a16:creationId xmlns:a16="http://schemas.microsoft.com/office/drawing/2014/main" id="{A277E114-6B85-436B-81E4-A9A9CD31F3B9}"/>
               </a:ext>
             </a:extLst>
           </p:cNvPr>
@@ -4388,154 +4416,235 @@
             <a:pPr algn="ctr"/>
             <a:r>
               <a:rPr lang="en-US" sz="4000" b="1" dirty="0"/>
-              <a:t>Links</a:t>
-            </a:r>
-          </a:p>
-        </p:txBody>
-      </p:sp>
-      <p:sp>
-        <p:nvSpPr>
-          <p:cNvPr id="3" name="Content Placeholder 2">
-            <a:extLst>
-              <a:ext uri="{FF2B5EF4-FFF2-40B4-BE49-F238E27FC236}">
-                <a16:creationId xmlns:a16="http://schemas.microsoft.com/office/drawing/2014/main" id="{29E005C8-1E15-4074-9126-F8EFED012995}"/>
-              </a:ext>
-            </a:extLst>
-          </p:cNvPr>
-          <p:cNvSpPr>
-            <a:spLocks noGrp="1"/>
-          </p:cNvSpPr>
-          <p:nvPr>
-            <p:ph idx="1"/>
-          </p:nvPr>
-        </p:nvSpPr>
-        <p:spPr>
-          <a:xfrm>
-            <a:off x="838200" y="1217141"/>
-            <a:ext cx="10515600" cy="4959822"/>
-          </a:xfrm>
-        </p:spPr>
-        <p:txBody>
-          <a:bodyPr>
-            <a:normAutofit/>
+              <a:t>Papers</a:t>
+            </a:r>
+          </a:p>
+        </p:txBody>
+      </p:sp>
+      <p:pic>
+        <p:nvPicPr>
+          <p:cNvPr id="8" name="Picture 7">
+            <a:extLst>
+              <a:ext uri="{FF2B5EF4-FFF2-40B4-BE49-F238E27FC236}">
+                <a16:creationId xmlns:a16="http://schemas.microsoft.com/office/drawing/2014/main" id="{936942D8-57D2-4A81-9959-FEAD149F4775}"/>
+              </a:ext>
+            </a:extLst>
+          </p:cNvPr>
+          <p:cNvPicPr>
+            <a:picLocks noChangeAspect="1"/>
+          </p:cNvPicPr>
+          <p:nvPr/>
+        </p:nvPicPr>
+        <p:blipFill>
+          <a:blip r:embed="rId3"/>
+          <a:stretch>
+            <a:fillRect/>
+          </a:stretch>
+        </p:blipFill>
+        <p:spPr>
+          <a:xfrm>
+            <a:off x="537334" y="3837759"/>
+            <a:ext cx="7087589" cy="2514951"/>
+          </a:xfrm>
+          <a:prstGeom prst="rect">
+            <a:avLst/>
+          </a:prstGeom>
+          <a:ln>
+            <a:solidFill>
+              <a:schemeClr val="accent1"/>
+            </a:solidFill>
+          </a:ln>
+        </p:spPr>
+      </p:pic>
+      <p:sp>
+        <p:nvSpPr>
+          <p:cNvPr id="9" name="TextBox 8">
+            <a:extLst>
+              <a:ext uri="{FF2B5EF4-FFF2-40B4-BE49-F238E27FC236}">
+                <a16:creationId xmlns:a16="http://schemas.microsoft.com/office/drawing/2014/main" id="{86397049-D502-45B6-BFA7-72406DF734F2}"/>
+              </a:ext>
+            </a:extLst>
+          </p:cNvPr>
+          <p:cNvSpPr txBox="1"/>
+          <p:nvPr/>
+        </p:nvSpPr>
+        <p:spPr>
+          <a:xfrm>
+            <a:off x="8544697" y="1219704"/>
+            <a:ext cx="3312125" cy="1200329"/>
+          </a:xfrm>
+          <a:prstGeom prst="rect">
+            <a:avLst/>
+          </a:prstGeom>
+          <a:noFill/>
+        </p:spPr>
+        <p:txBody>
+          <a:bodyPr wrap="none" rtlCol="0">
+            <a:spAutoFit/>
           </a:bodyPr>
           <a:lstStyle/>
           <a:p>
-            <a:pPr marL="0" indent="0">
-              <a:buNone/>
-            </a:pPr>
-            <a:r>
-              <a:rPr lang="en-US" b="1" dirty="0"/>
-              <a:t>Papers</a:t>
-            </a:r>
-          </a:p>
-          <a:p>
-            <a:pPr lvl="1"/>
-            <a:r>
-              <a:rPr lang="en-US" dirty="0">
-                <a:hlinkClick r:id="rId2"/>
+            <a:r>
+              <a:rPr lang="en-US" sz="2400" dirty="0">
+                <a:solidFill>
+                  <a:srgbClr val="002060"/>
+                </a:solidFill>
               </a:rPr>
-              <a:t>https://ui.adsabs.harvard.edu/abs/2020MNRAS.491.1554W/abstract</a:t>
-            </a:r>
-            <a:r>
-              <a:rPr lang="en-US" dirty="0"/>
-              <a:t> (W+20)</a:t>
-            </a:r>
-          </a:p>
-          <a:p>
-            <a:pPr lvl="1"/>
-            <a:r>
-              <a:rPr lang="en-US" dirty="0">
-                <a:hlinkClick r:id="rId3"/>
+              <a:t>MNRAS </a:t>
+            </a:r>
+            <a:r>
+              <a:rPr lang="en-US" sz="2400" b="1" dirty="0">
+                <a:solidFill>
+                  <a:srgbClr val="002060"/>
+                </a:solidFill>
               </a:rPr>
-              <a:t>https://ui.adsabs.harvard.edu/abs/2022MNRAS.509.3966W/abstract</a:t>
-            </a:r>
-            <a:r>
-              <a:rPr lang="en-US" dirty="0"/>
-              <a:t> (W+21)</a:t>
-            </a:r>
-            <a:endParaRPr lang="en-US" b="1" dirty="0"/>
-          </a:p>
-          <a:p>
-            <a:pPr marL="0" indent="0">
-              <a:spcBef>
-                <a:spcPts val="2400"/>
-              </a:spcBef>
-              <a:buNone/>
-            </a:pPr>
-            <a:r>
-              <a:rPr lang="en-US" b="1" dirty="0"/>
-              <a:t>Mike Walmsley repos</a:t>
-            </a:r>
-          </a:p>
-          <a:p>
-            <a:pPr lvl="1"/>
-            <a:r>
-              <a:rPr lang="en-US" dirty="0"/>
-              <a:t>For W+20: </a:t>
-            </a:r>
-            <a:r>
-              <a:rPr lang="en-US" dirty="0">
-                <a:hlinkClick r:id="rId4"/>
+              <a:t>491</a:t>
+            </a:r>
+            <a:r>
+              <a:rPr lang="en-US" sz="2400" dirty="0">
+                <a:solidFill>
+                  <a:srgbClr val="002060"/>
+                </a:solidFill>
               </a:rPr>
-              <a:t>https://github.com/mwalmsley/galaxy-zoo-bayesian-cnn</a:t>
-            </a:r>
-            <a:r>
-              <a:rPr lang="en-US" dirty="0"/>
-              <a:t> </a:t>
-            </a:r>
-          </a:p>
-          <a:p>
-            <a:pPr lvl="1"/>
-            <a:r>
-              <a:rPr lang="en-US" dirty="0"/>
-              <a:t>For W+21: </a:t>
-            </a:r>
-            <a:r>
-              <a:rPr lang="en-US" dirty="0">
-                <a:hlinkClick r:id="rId5"/>
+              <a:t>, 1554 (2020)</a:t>
+            </a:r>
+          </a:p>
+          <a:p>
+            <a:endParaRPr lang="en-US" sz="2400" dirty="0">
+              <a:solidFill>
+                <a:srgbClr val="002060"/>
+              </a:solidFill>
+            </a:endParaRPr>
+          </a:p>
+          <a:p>
+            <a:r>
+              <a:rPr lang="en-US" sz="2400" dirty="0">
+                <a:solidFill>
+                  <a:srgbClr val="002060"/>
+                </a:solidFill>
               </a:rPr>
-              <a:t>https://github.com/mwalmsley/zoobot</a:t>
-            </a:r>
-            <a:endParaRPr lang="en-US" dirty="0"/>
-          </a:p>
-          <a:p>
-            <a:pPr marL="0" indent="0">
-              <a:spcBef>
-                <a:spcPts val="2400"/>
-              </a:spcBef>
-              <a:buNone/>
-            </a:pPr>
-            <a:r>
-              <a:rPr lang="en-US" b="1" dirty="0"/>
-              <a:t>My repo</a:t>
-            </a:r>
-          </a:p>
-          <a:p>
-            <a:pPr lvl="1"/>
-            <a:r>
-              <a:rPr lang="en-US" dirty="0">
-                <a:hlinkClick r:id="rId6"/>
+              <a:t>(W+20)</a:t>
+            </a:r>
+          </a:p>
+        </p:txBody>
+      </p:sp>
+      <p:sp>
+        <p:nvSpPr>
+          <p:cNvPr id="10" name="TextBox 9">
+            <a:extLst>
+              <a:ext uri="{FF2B5EF4-FFF2-40B4-BE49-F238E27FC236}">
+                <a16:creationId xmlns:a16="http://schemas.microsoft.com/office/drawing/2014/main" id="{6A786D2E-EB24-493F-BBBF-E957000CEC1E}"/>
+              </a:ext>
+            </a:extLst>
+          </p:cNvPr>
+          <p:cNvSpPr txBox="1"/>
+          <p:nvPr/>
+        </p:nvSpPr>
+        <p:spPr>
+          <a:xfrm>
+            <a:off x="8443619" y="4062108"/>
+            <a:ext cx="3312125" cy="1200329"/>
+          </a:xfrm>
+          <a:prstGeom prst="rect">
+            <a:avLst/>
+          </a:prstGeom>
+          <a:noFill/>
+        </p:spPr>
+        <p:txBody>
+          <a:bodyPr wrap="none" rtlCol="0">
+            <a:spAutoFit/>
+          </a:bodyPr>
+          <a:lstStyle/>
+          <a:p>
+            <a:r>
+              <a:rPr lang="en-US" sz="2400" dirty="0">
+                <a:solidFill>
+                  <a:srgbClr val="002060"/>
+                </a:solidFill>
               </a:rPr>
-              <a:t>https://github.com/colinleach/proj502</a:t>
-            </a:r>
-            <a:endParaRPr lang="en-US" dirty="0"/>
-          </a:p>
-          <a:p>
-            <a:pPr lvl="1"/>
-            <a:endParaRPr lang="en-US" dirty="0"/>
-          </a:p>
-          <a:p>
-            <a:endParaRPr lang="en-US" dirty="0"/>
-          </a:p>
-        </p:txBody>
-      </p:sp>
-      <p:sp>
-        <p:nvSpPr>
-          <p:cNvPr id="4" name="Slide Number Placeholder 3">
-            <a:extLst>
-              <a:ext uri="{FF2B5EF4-FFF2-40B4-BE49-F238E27FC236}">
-                <a16:creationId xmlns:a16="http://schemas.microsoft.com/office/drawing/2014/main" id="{B603E858-4EF6-4A26-9057-04048E3064F1}"/>
+              <a:t>MNRAS </a:t>
+            </a:r>
+            <a:r>
+              <a:rPr lang="en-US" sz="2400" b="1" dirty="0">
+                <a:solidFill>
+                  <a:srgbClr val="002060"/>
+                </a:solidFill>
+              </a:rPr>
+              <a:t>509</a:t>
+            </a:r>
+            <a:r>
+              <a:rPr lang="en-US" sz="2400" dirty="0">
+                <a:solidFill>
+                  <a:srgbClr val="002060"/>
+                </a:solidFill>
+              </a:rPr>
+              <a:t>, 3966 (2021)</a:t>
+            </a:r>
+          </a:p>
+          <a:p>
+            <a:endParaRPr lang="en-US" sz="2400" dirty="0">
+              <a:solidFill>
+                <a:srgbClr val="002060"/>
+              </a:solidFill>
+            </a:endParaRPr>
+          </a:p>
+          <a:p>
+            <a:r>
+              <a:rPr lang="en-US" sz="2400" dirty="0">
+                <a:solidFill>
+                  <a:srgbClr val="002060"/>
+                </a:solidFill>
+              </a:rPr>
+              <a:t>(W+21)</a:t>
+            </a:r>
+          </a:p>
+        </p:txBody>
+      </p:sp>
+      <p:sp>
+        <p:nvSpPr>
+          <p:cNvPr id="11" name="TextBox 10">
+            <a:extLst>
+              <a:ext uri="{FF2B5EF4-FFF2-40B4-BE49-F238E27FC236}">
+                <a16:creationId xmlns:a16="http://schemas.microsoft.com/office/drawing/2014/main" id="{7BF2819D-CE34-4683-A78D-F53B0C1B351D}"/>
+              </a:ext>
+            </a:extLst>
+          </p:cNvPr>
+          <p:cNvSpPr txBox="1"/>
+          <p:nvPr/>
+        </p:nvSpPr>
+        <p:spPr>
+          <a:xfrm>
+            <a:off x="8443619" y="5641911"/>
+            <a:ext cx="3211047" cy="707886"/>
+          </a:xfrm>
+          <a:prstGeom prst="rect">
+            <a:avLst/>
+          </a:prstGeom>
+          <a:noFill/>
+        </p:spPr>
+        <p:txBody>
+          <a:bodyPr wrap="square" rtlCol="0">
+            <a:spAutoFit/>
+          </a:bodyPr>
+          <a:lstStyle/>
+          <a:p>
+            <a:r>
+              <a:rPr lang="en-US" sz="2000" i="1" dirty="0">
+                <a:solidFill>
+                  <a:srgbClr val="FF0000"/>
+                </a:solidFill>
+              </a:rPr>
+              <a:t>Better methods, better code, much better documentation</a:t>
+            </a:r>
+          </a:p>
+        </p:txBody>
+      </p:sp>
+      <p:sp>
+        <p:nvSpPr>
+          <p:cNvPr id="15" name="Slide Number Placeholder 3">
+            <a:extLst>
+              <a:ext uri="{FF2B5EF4-FFF2-40B4-BE49-F238E27FC236}">
+                <a16:creationId xmlns:a16="http://schemas.microsoft.com/office/drawing/2014/main" id="{E5F9CDD4-0A2F-4D4F-B10F-DCAF4DB05B08}"/>
               </a:ext>
             </a:extLst>
           </p:cNvPr>
@@ -4567,7 +4676,7 @@
     </p:spTree>
     <p:extLst>
       <p:ext uri="{BB962C8B-B14F-4D97-AF65-F5344CB8AC3E}">
-        <p14:creationId xmlns:p14="http://schemas.microsoft.com/office/powerpoint/2010/main" val="2282774879"/>
+        <p14:creationId xmlns:p14="http://schemas.microsoft.com/office/powerpoint/2010/main" val="688114331"/>
       </p:ext>
     </p:extLst>
   </p:cSld>
@@ -4599,7 +4708,7 @@
           <p:cNvPr id="2" name="Title 1">
             <a:extLst>
               <a:ext uri="{FF2B5EF4-FFF2-40B4-BE49-F238E27FC236}">
-                <a16:creationId xmlns:a16="http://schemas.microsoft.com/office/drawing/2014/main" id="{1EB5FFA0-9E80-4F57-A866-AF19D79B387E}"/>
+                <a16:creationId xmlns:a16="http://schemas.microsoft.com/office/drawing/2014/main" id="{53555D55-9F12-4F72-A480-57881EF1D6BF}"/>
               </a:ext>
             </a:extLst>
           </p:cNvPr>
@@ -4610,14 +4719,22 @@
             <p:ph type="title"/>
           </p:nvPr>
         </p:nvSpPr>
-        <p:spPr/>
-        <p:txBody>
-          <a:bodyPr/>
-          <a:lstStyle/>
-          <a:p>
-            <a:r>
-              <a:rPr lang="en-US" dirty="0"/>
-              <a:t>Objectives (original)</a:t>
+        <p:spPr>
+          <a:xfrm>
+            <a:off x="838200" y="365126"/>
+            <a:ext cx="10515600" cy="611058"/>
+          </a:xfrm>
+        </p:spPr>
+        <p:txBody>
+          <a:bodyPr>
+            <a:noAutofit/>
+          </a:bodyPr>
+          <a:lstStyle/>
+          <a:p>
+            <a:pPr algn="ctr"/>
+            <a:r>
+              <a:rPr lang="en-US" sz="4000" b="1" dirty="0"/>
+              <a:t>Links</a:t>
             </a:r>
           </a:p>
         </p:txBody>
@@ -4627,7 +4744,7 @@
           <p:cNvPr id="3" name="Content Placeholder 2">
             <a:extLst>
               <a:ext uri="{FF2B5EF4-FFF2-40B4-BE49-F238E27FC236}">
-                <a16:creationId xmlns:a16="http://schemas.microsoft.com/office/drawing/2014/main" id="{1EB6C2B2-6801-47D6-A199-6AC7501E860F}"/>
+                <a16:creationId xmlns:a16="http://schemas.microsoft.com/office/drawing/2014/main" id="{29E005C8-1E15-4074-9126-F8EFED012995}"/>
               </a:ext>
             </a:extLst>
           </p:cNvPr>
@@ -4640,8 +4757,8 @@
         </p:nvSpPr>
         <p:spPr>
           <a:xfrm>
-            <a:off x="838200" y="1491270"/>
-            <a:ext cx="10326130" cy="4685693"/>
+            <a:off x="838200" y="1217141"/>
+            <a:ext cx="10515600" cy="4959822"/>
           </a:xfrm>
         </p:spPr>
         <p:txBody>
@@ -4650,85 +4767,121 @@
           </a:bodyPr>
           <a:lstStyle/>
           <a:p>
+            <a:pPr marL="0" indent="0">
+              <a:buNone/>
+            </a:pPr>
+            <a:r>
+              <a:rPr lang="en-US" b="1" dirty="0"/>
+              <a:t>Papers</a:t>
+            </a:r>
+          </a:p>
+          <a:p>
+            <a:pPr lvl="1"/>
+            <a:r>
+              <a:rPr lang="en-US" dirty="0">
+                <a:hlinkClick r:id="rId2"/>
+              </a:rPr>
+              <a:t>https://ui.adsabs.harvard.edu/abs/2020MNRAS.491.1554W/abstract</a:t>
+            </a:r>
             <a:r>
               <a:rPr lang="en-US" dirty="0"/>
-              <a:t>Get the published code running on my local machine, </a:t>
-            </a:r>
-            <a:br>
+              <a:t> (W+20)</a:t>
+            </a:r>
+          </a:p>
+          <a:p>
+            <a:pPr lvl="1"/>
+            <a:r>
+              <a:rPr lang="en-US" dirty="0">
+                <a:hlinkClick r:id="rId3"/>
+              </a:rPr>
+              <a:t>https://ui.adsabs.harvard.edu/abs/2022MNRAS.509.3966W/abstract</a:t>
+            </a:r>
+            <a:r>
               <a:rPr lang="en-US" dirty="0"/>
-            </a:br>
+              <a:t> (W+21)</a:t>
+            </a:r>
+            <a:endParaRPr lang="en-US" b="1" dirty="0"/>
+          </a:p>
+          <a:p>
+            <a:pPr marL="0" indent="0">
+              <a:spcBef>
+                <a:spcPts val="2400"/>
+              </a:spcBef>
+              <a:buNone/>
+            </a:pPr>
+            <a:r>
+              <a:rPr lang="en-US" b="1" dirty="0"/>
+              <a:t>Mike Walmsley repos</a:t>
+            </a:r>
+          </a:p>
+          <a:p>
+            <a:pPr lvl="1"/>
             <a:r>
               <a:rPr lang="en-US" dirty="0"/>
-              <a:t>using whatever cut-down training set proves viable.</a:t>
-            </a:r>
-          </a:p>
-          <a:p>
+              <a:t>For W+20: </a:t>
+            </a:r>
+            <a:r>
+              <a:rPr lang="en-US" dirty="0">
+                <a:hlinkClick r:id="rId4"/>
+              </a:rPr>
+              <a:t>https://github.com/mwalmsley/galaxy-zoo-bayesian-cnn</a:t>
+            </a:r>
             <a:r>
               <a:rPr lang="en-US" dirty="0"/>
-              <a:t>Deploy the code on either AWS or Google.</a:t>
-            </a:r>
-          </a:p>
-          <a:p>
+              <a:t> </a:t>
+            </a:r>
+          </a:p>
+          <a:p>
+            <a:pPr lvl="1"/>
             <a:r>
               <a:rPr lang="en-US" dirty="0"/>
-              <a:t>Extend the model to other data such as Hubble, CANDELS, </a:t>
-            </a:r>
-            <a:r>
-              <a:rPr lang="en-US" dirty="0" err="1"/>
-              <a:t>DECaLS</a:t>
-            </a:r>
-            <a:r>
-              <a:rPr lang="en-US" dirty="0"/>
-              <a:t>, for which there is already some GZ classification.</a:t>
-            </a:r>
-          </a:p>
-          <a:p>
-            <a:r>
-              <a:rPr lang="en-US" dirty="0"/>
-              <a:t>Think about newer CNN algorithms </a:t>
-            </a:r>
-            <a:r>
-              <a:rPr lang="en-US" sz="2400" i="1" dirty="0"/>
-              <a:t>(W+20 used VGG16)</a:t>
-            </a:r>
-            <a:endParaRPr lang="en-US" i="1" dirty="0"/>
-          </a:p>
-          <a:p>
-            <a:r>
-              <a:rPr lang="en-US" dirty="0"/>
-              <a:t>Rewrite using other frameworks, for my education:</a:t>
+              <a:t>For W+21: </a:t>
+            </a:r>
+            <a:r>
+              <a:rPr lang="en-US" dirty="0">
+                <a:hlinkClick r:id="rId5"/>
+              </a:rPr>
+              <a:t>https://github.com/mwalmsley/zoobot</a:t>
+            </a:r>
+            <a:endParaRPr lang="en-US" dirty="0"/>
+          </a:p>
+          <a:p>
+            <a:pPr marL="0" indent="0">
+              <a:spcBef>
+                <a:spcPts val="2400"/>
+              </a:spcBef>
+              <a:buNone/>
+            </a:pPr>
+            <a:r>
+              <a:rPr lang="en-US" b="1" dirty="0"/>
+              <a:t>My repo</a:t>
             </a:r>
           </a:p>
           <a:p>
             <a:pPr lvl="1"/>
             <a:r>
-              <a:rPr lang="en-US" dirty="0" err="1"/>
-              <a:t>PyTorch</a:t>
+              <a:rPr lang="en-US" dirty="0">
+                <a:hlinkClick r:id="rId6"/>
+              </a:rPr>
+              <a:t>https://github.com/colinleach/proj502</a:t>
             </a:r>
             <a:endParaRPr lang="en-US" dirty="0"/>
           </a:p>
           <a:p>
             <a:pPr lvl="1"/>
-            <a:r>
-              <a:rPr lang="en-US" dirty="0"/>
-              <a:t>Julia with Flux</a:t>
-            </a:r>
-          </a:p>
-          <a:p>
-            <a:pPr lvl="1"/>
-            <a:r>
-              <a:rPr lang="en-US" i="1" dirty="0"/>
-              <a:t>(F#  with ML.NET, but don't hold your breath waiting for that!)</a:t>
-            </a:r>
-          </a:p>
-        </p:txBody>
-      </p:sp>
-      <p:sp>
-        <p:nvSpPr>
-          <p:cNvPr id="7" name="Slide Number Placeholder 3">
-            <a:extLst>
-              <a:ext uri="{FF2B5EF4-FFF2-40B4-BE49-F238E27FC236}">
-                <a16:creationId xmlns:a16="http://schemas.microsoft.com/office/drawing/2014/main" id="{754586BD-95DC-4C45-B80E-4905FE92E307}"/>
+            <a:endParaRPr lang="en-US" dirty="0"/>
+          </a:p>
+          <a:p>
+            <a:endParaRPr lang="en-US" dirty="0"/>
+          </a:p>
+        </p:txBody>
+      </p:sp>
+      <p:sp>
+        <p:nvSpPr>
+          <p:cNvPr id="4" name="Slide Number Placeholder 3">
+            <a:extLst>
+              <a:ext uri="{FF2B5EF4-FFF2-40B4-BE49-F238E27FC236}">
+                <a16:creationId xmlns:a16="http://schemas.microsoft.com/office/drawing/2014/main" id="{B603E858-4EF6-4A26-9057-04048E3064F1}"/>
               </a:ext>
             </a:extLst>
           </p:cNvPr>
@@ -4760,7 +4913,7 @@
     </p:spTree>
     <p:extLst>
       <p:ext uri="{BB962C8B-B14F-4D97-AF65-F5344CB8AC3E}">
-        <p14:creationId xmlns:p14="http://schemas.microsoft.com/office/powerpoint/2010/main" val="512022980"/>
+        <p14:creationId xmlns:p14="http://schemas.microsoft.com/office/powerpoint/2010/main" val="2282774879"/>
       </p:ext>
     </p:extLst>
   </p:cSld>
@@ -4810,7 +4963,7 @@
           <a:p>
             <a:r>
               <a:rPr lang="en-US" dirty="0"/>
-              <a:t>Objectives (modified)</a:t>
+              <a:t>Objectives (original)</a:t>
             </a:r>
           </a:p>
         </p:txBody>
@@ -4831,7 +4984,12 @@
             <p:ph idx="1"/>
           </p:nvPr>
         </p:nvSpPr>
-        <p:spPr/>
+        <p:spPr>
+          <a:xfrm>
+            <a:off x="838200" y="1491270"/>
+            <a:ext cx="10326130" cy="4685693"/>
+          </a:xfrm>
+        </p:spPr>
         <p:txBody>
           <a:bodyPr>
             <a:normAutofit/>
@@ -4840,7 +4998,14 @@
           <a:p>
             <a:r>
               <a:rPr lang="en-US" dirty="0"/>
-              <a:t>Get the published code running on my local machine, using whatever cut-down training set proves viable.</a:t>
+              <a:t>Get the published code running on my local machine, </a:t>
+            </a:r>
+            <a:br>
+              <a:rPr lang="en-US" dirty="0"/>
+            </a:br>
+            <a:r>
+              <a:rPr lang="en-US" dirty="0"/>
+              <a:t>using whatever cut-down training set proves viable.</a:t>
             </a:r>
           </a:p>
           <a:p>
@@ -4852,7 +5017,7 @@
           <a:p>
             <a:r>
               <a:rPr lang="en-US" dirty="0"/>
-              <a:t>Use GZ2 and </a:t>
+              <a:t>Extend the model to other data such as Hubble, CANDELS, </a:t>
             </a:r>
             <a:r>
               <a:rPr lang="en-US" dirty="0" err="1"/>
@@ -4860,87 +5025,33 @@
             </a:r>
             <a:r>
               <a:rPr lang="en-US" dirty="0"/>
-              <a:t> data initially, perhaps others later</a:t>
+              <a:t>, for which there is already some GZ classification.</a:t>
             </a:r>
           </a:p>
           <a:p>
             <a:r>
               <a:rPr lang="en-US" dirty="0"/>
-              <a:t> </a:t>
-            </a:r>
-            <a:r>
-              <a:rPr lang="en-US" strike="dblStrike" dirty="0">
-                <a:solidFill>
-                  <a:srgbClr val="FF0000"/>
-                </a:solidFill>
-              </a:rPr>
-              <a:t>Think about newer CNN algorithms</a:t>
-            </a:r>
+              <a:t>Think about newer CNN algorithms </a:t>
+            </a:r>
+            <a:r>
+              <a:rPr lang="en-US" sz="2400" i="1" dirty="0"/>
+              <a:t>(W+20 used VGG16)</a:t>
+            </a:r>
+            <a:endParaRPr lang="en-US" i="1" dirty="0"/>
+          </a:p>
+          <a:p>
             <a:r>
               <a:rPr lang="en-US" dirty="0"/>
-              <a:t> Stick with </a:t>
-            </a:r>
-            <a:r>
-              <a:rPr lang="en-US" dirty="0" err="1"/>
-              <a:t>EfficientNet</a:t>
-            </a:r>
-            <a:r>
-              <a:rPr lang="en-US" dirty="0"/>
-              <a:t> B0</a:t>
-            </a:r>
-          </a:p>
-          <a:p>
-            <a:r>
-              <a:rPr lang="en-US" dirty="0"/>
-              <a:t>Repeat with </a:t>
-            </a:r>
+              <a:t>Rewrite using other frameworks, for my education:</a:t>
+            </a:r>
+          </a:p>
+          <a:p>
+            <a:pPr lvl="1"/>
             <a:r>
               <a:rPr lang="en-US" dirty="0" err="1"/>
               <a:t>PyTorch</a:t>
             </a:r>
-            <a:r>
-              <a:rPr lang="en-US" dirty="0"/>
-              <a:t>  </a:t>
-            </a:r>
-            <a:r>
-              <a:rPr lang="en-US" sz="2400" i="1" dirty="0"/>
-              <a:t>(code from branch of </a:t>
-            </a:r>
-            <a:r>
-              <a:rPr lang="en-US" sz="2400" i="1" dirty="0" err="1"/>
-              <a:t>mwalmsley</a:t>
-            </a:r>
-            <a:r>
-              <a:rPr lang="en-US" sz="2400" i="1" dirty="0"/>
-              <a:t>/</a:t>
-            </a:r>
-            <a:r>
-              <a:rPr lang="en-US" sz="2400" i="1" dirty="0" err="1"/>
-              <a:t>zoobot</a:t>
-            </a:r>
-            <a:r>
-              <a:rPr lang="en-US" sz="2400" i="1" dirty="0"/>
-              <a:t>)</a:t>
-            </a:r>
-          </a:p>
-          <a:p>
-            <a:pPr>
-              <a:spcBef>
-                <a:spcPts val="2400"/>
-              </a:spcBef>
-            </a:pPr>
-            <a:r>
-              <a:rPr lang="en-US" b="1" dirty="0">
-                <a:solidFill>
-                  <a:srgbClr val="FF0000"/>
-                </a:solidFill>
-              </a:rPr>
-              <a:t>Later,</a:t>
-            </a:r>
-            <a:r>
-              <a:rPr lang="en-US" dirty="0"/>
-              <a:t> rewrite using other frameworks, for my education:</a:t>
-            </a:r>
+            <a:endParaRPr lang="en-US" dirty="0"/>
           </a:p>
           <a:p>
             <a:pPr lvl="1"/>
@@ -4960,10 +5071,10 @@
       </p:sp>
       <p:sp>
         <p:nvSpPr>
-          <p:cNvPr id="4" name="Slide Number Placeholder 3">
-            <a:extLst>
-              <a:ext uri="{FF2B5EF4-FFF2-40B4-BE49-F238E27FC236}">
-                <a16:creationId xmlns:a16="http://schemas.microsoft.com/office/drawing/2014/main" id="{C0A4D4EF-A04F-41AE-8CC3-CDDE408C9A89}"/>
+          <p:cNvPr id="7" name="Slide Number Placeholder 3">
+            <a:extLst>
+              <a:ext uri="{FF2B5EF4-FFF2-40B4-BE49-F238E27FC236}">
+                <a16:creationId xmlns:a16="http://schemas.microsoft.com/office/drawing/2014/main" id="{754586BD-95DC-4C45-B80E-4905FE92E307}"/>
               </a:ext>
             </a:extLst>
           </p:cNvPr>
@@ -4995,7 +5106,7 @@
     </p:spTree>
     <p:extLst>
       <p:ext uri="{BB962C8B-B14F-4D97-AF65-F5344CB8AC3E}">
-        <p14:creationId xmlns:p14="http://schemas.microsoft.com/office/powerpoint/2010/main" val="3483662598"/>
+        <p14:creationId xmlns:p14="http://schemas.microsoft.com/office/powerpoint/2010/main" val="512022980"/>
       </p:ext>
     </p:extLst>
   </p:cSld>
@@ -5024,10 +5135,10 @@
       </p:grpSpPr>
       <p:sp>
         <p:nvSpPr>
-          <p:cNvPr id="4" name="Title 3">
-            <a:extLst>
-              <a:ext uri="{FF2B5EF4-FFF2-40B4-BE49-F238E27FC236}">
-                <a16:creationId xmlns:a16="http://schemas.microsoft.com/office/drawing/2014/main" id="{90F21F14-2A32-47FA-9ECC-A6C9B8B863E5}"/>
+          <p:cNvPr id="2" name="Title 1">
+            <a:extLst>
+              <a:ext uri="{FF2B5EF4-FFF2-40B4-BE49-F238E27FC236}">
+                <a16:creationId xmlns:a16="http://schemas.microsoft.com/office/drawing/2014/main" id="{1EB5FFA0-9E80-4F57-A866-AF19D79B387E}"/>
               </a:ext>
             </a:extLst>
           </p:cNvPr>
@@ -5044,19 +5155,18 @@
           <a:lstStyle/>
           <a:p>
             <a:r>
-              <a:rPr lang="en-US"/>
-              <a:t>Galaxy Morphology Classification</a:t>
-            </a:r>
-            <a:endParaRPr lang="en-US" dirty="0"/>
-          </a:p>
-        </p:txBody>
-      </p:sp>
-      <p:sp>
-        <p:nvSpPr>
-          <p:cNvPr id="5" name="Content Placeholder 4">
-            <a:extLst>
-              <a:ext uri="{FF2B5EF4-FFF2-40B4-BE49-F238E27FC236}">
-                <a16:creationId xmlns:a16="http://schemas.microsoft.com/office/drawing/2014/main" id="{CA5066AD-2BFC-4153-A603-524464379A8E}"/>
+              <a:rPr lang="en-US" dirty="0"/>
+              <a:t>Objectives (modified)</a:t>
+            </a:r>
+          </a:p>
+        </p:txBody>
+      </p:sp>
+      <p:sp>
+        <p:nvSpPr>
+          <p:cNvPr id="3" name="Content Placeholder 2">
+            <a:extLst>
+              <a:ext uri="{FF2B5EF4-FFF2-40B4-BE49-F238E27FC236}">
+                <a16:creationId xmlns:a16="http://schemas.microsoft.com/office/drawing/2014/main" id="{1EB6C2B2-6801-47D6-A199-6AC7501E860F}"/>
               </a:ext>
             </a:extLst>
           </p:cNvPr>
@@ -5069,19 +5179,137 @@
         </p:nvSpPr>
         <p:spPr/>
         <p:txBody>
-          <a:bodyPr/>
-          <a:lstStyle/>
-          <a:p>
-            <a:endParaRPr lang="en-US"/>
-          </a:p>
-        </p:txBody>
-      </p:sp>
-      <p:sp>
-        <p:nvSpPr>
-          <p:cNvPr id="6" name="Slide Number Placeholder 3">
-            <a:extLst>
-              <a:ext uri="{FF2B5EF4-FFF2-40B4-BE49-F238E27FC236}">
-                <a16:creationId xmlns:a16="http://schemas.microsoft.com/office/drawing/2014/main" id="{E51AF25F-4637-4CEC-A64B-6DF9E1BB83E0}"/>
+          <a:bodyPr>
+            <a:normAutofit/>
+          </a:bodyPr>
+          <a:lstStyle/>
+          <a:p>
+            <a:r>
+              <a:rPr lang="en-US" dirty="0"/>
+              <a:t>Get the published code running on my local machine, using whatever cut-down training set proves viable.</a:t>
+            </a:r>
+          </a:p>
+          <a:p>
+            <a:r>
+              <a:rPr lang="en-US" dirty="0"/>
+              <a:t>Deploy the code on either AWS or Google.</a:t>
+            </a:r>
+          </a:p>
+          <a:p>
+            <a:r>
+              <a:rPr lang="en-US" dirty="0"/>
+              <a:t>Use GZ2 and </a:t>
+            </a:r>
+            <a:r>
+              <a:rPr lang="en-US" dirty="0" err="1"/>
+              <a:t>DECaLS</a:t>
+            </a:r>
+            <a:r>
+              <a:rPr lang="en-US" dirty="0"/>
+              <a:t> data initially, perhaps others later</a:t>
+            </a:r>
+          </a:p>
+          <a:p>
+            <a:r>
+              <a:rPr lang="en-US" dirty="0"/>
+              <a:t> </a:t>
+            </a:r>
+            <a:r>
+              <a:rPr lang="en-US" strike="dblStrike" dirty="0">
+                <a:solidFill>
+                  <a:srgbClr val="FF0000"/>
+                </a:solidFill>
+              </a:rPr>
+              <a:t>Think about newer CNN algorithms</a:t>
+            </a:r>
+            <a:r>
+              <a:rPr lang="en-US" dirty="0"/>
+              <a:t> Stick with </a:t>
+            </a:r>
+            <a:r>
+              <a:rPr lang="en-US" dirty="0" err="1"/>
+              <a:t>EfficientNet</a:t>
+            </a:r>
+            <a:r>
+              <a:rPr lang="en-US" dirty="0"/>
+              <a:t> B0</a:t>
+            </a:r>
+          </a:p>
+          <a:p>
+            <a:r>
+              <a:rPr lang="en-US" dirty="0"/>
+              <a:t>Repeat with </a:t>
+            </a:r>
+            <a:r>
+              <a:rPr lang="en-US" dirty="0" err="1"/>
+              <a:t>PyTorch</a:t>
+            </a:r>
+            <a:r>
+              <a:rPr lang="en-US" dirty="0"/>
+              <a:t>  </a:t>
+            </a:r>
+            <a:r>
+              <a:rPr lang="en-US" sz="2400" i="1" dirty="0"/>
+              <a:t>(code from branch of </a:t>
+            </a:r>
+            <a:r>
+              <a:rPr lang="en-US" sz="2400" i="1" dirty="0" err="1"/>
+              <a:t>mwalmsley</a:t>
+            </a:r>
+            <a:r>
+              <a:rPr lang="en-US" sz="2400" i="1" dirty="0"/>
+              <a:t>/</a:t>
+            </a:r>
+            <a:r>
+              <a:rPr lang="en-US" sz="2400" i="1" dirty="0" err="1"/>
+              <a:t>zoobot</a:t>
+            </a:r>
+            <a:r>
+              <a:rPr lang="en-US" sz="2400" i="1" dirty="0"/>
+              <a:t>)</a:t>
+            </a:r>
+          </a:p>
+          <a:p>
+            <a:pPr>
+              <a:spcBef>
+                <a:spcPts val="2400"/>
+              </a:spcBef>
+            </a:pPr>
+            <a:r>
+              <a:rPr lang="en-US" b="1" dirty="0">
+                <a:solidFill>
+                  <a:srgbClr val="FF0000"/>
+                </a:solidFill>
+              </a:rPr>
+              <a:t>Later,</a:t>
+            </a:r>
+            <a:r>
+              <a:rPr lang="en-US" dirty="0"/>
+              <a:t> rewrite using other frameworks, for my education:</a:t>
+            </a:r>
+          </a:p>
+          <a:p>
+            <a:pPr lvl="1"/>
+            <a:r>
+              <a:rPr lang="en-US" dirty="0"/>
+              <a:t>Julia with Flux</a:t>
+            </a:r>
+          </a:p>
+          <a:p>
+            <a:pPr lvl="1"/>
+            <a:r>
+              <a:rPr lang="en-US" i="1" dirty="0"/>
+              <a:t>(F#  with ML.NET, but don't hold your breath waiting for that!)</a:t>
+            </a:r>
+          </a:p>
+        </p:txBody>
+      </p:sp>
+      <p:sp>
+        <p:nvSpPr>
+          <p:cNvPr id="4" name="Slide Number Placeholder 3">
+            <a:extLst>
+              <a:ext uri="{FF2B5EF4-FFF2-40B4-BE49-F238E27FC236}">
+                <a16:creationId xmlns:a16="http://schemas.microsoft.com/office/drawing/2014/main" id="{C0A4D4EF-A04F-41AE-8CC3-CDDE408C9A89}"/>
               </a:ext>
             </a:extLst>
           </p:cNvPr>
@@ -5113,7 +5341,759 @@
     </p:spTree>
     <p:extLst>
       <p:ext uri="{BB962C8B-B14F-4D97-AF65-F5344CB8AC3E}">
+        <p14:creationId xmlns:p14="http://schemas.microsoft.com/office/powerpoint/2010/main" val="3483662598"/>
+      </p:ext>
+    </p:extLst>
+  </p:cSld>
+  <p:clrMapOvr>
+    <a:masterClrMapping/>
+  </p:clrMapOvr>
+</p:sld>
+</file>
+
+<file path=ppt/slides/slide7.xml><?xml version="1.0" encoding="utf-8"?>
+<p:sld xmlns:a="http://schemas.openxmlformats.org/drawingml/2006/main" xmlns:r="http://schemas.openxmlformats.org/officeDocument/2006/relationships" xmlns:p="http://schemas.openxmlformats.org/presentationml/2006/main">
+  <p:cSld>
+    <p:spTree>
+      <p:nvGrpSpPr>
+        <p:cNvPr id="1" name=""/>
+        <p:cNvGrpSpPr/>
+        <p:nvPr/>
+      </p:nvGrpSpPr>
+      <p:grpSpPr>
+        <a:xfrm>
+          <a:off x="0" y="0"/>
+          <a:ext cx="0" cy="0"/>
+          <a:chOff x="0" y="0"/>
+          <a:chExt cx="0" cy="0"/>
+        </a:xfrm>
+      </p:grpSpPr>
+      <p:sp>
+        <p:nvSpPr>
+          <p:cNvPr id="4" name="Title 3">
+            <a:extLst>
+              <a:ext uri="{FF2B5EF4-FFF2-40B4-BE49-F238E27FC236}">
+                <a16:creationId xmlns:a16="http://schemas.microsoft.com/office/drawing/2014/main" id="{90F21F14-2A32-47FA-9ECC-A6C9B8B863E5}"/>
+              </a:ext>
+            </a:extLst>
+          </p:cNvPr>
+          <p:cNvSpPr>
+            <a:spLocks noGrp="1"/>
+          </p:cNvSpPr>
+          <p:nvPr>
+            <p:ph type="title"/>
+          </p:nvPr>
+        </p:nvSpPr>
+        <p:spPr/>
+        <p:txBody>
+          <a:bodyPr/>
+          <a:lstStyle/>
+          <a:p>
+            <a:r>
+              <a:rPr lang="en-US"/>
+              <a:t>Galaxy Morphology Classification</a:t>
+            </a:r>
+            <a:endParaRPr lang="en-US" dirty="0"/>
+          </a:p>
+        </p:txBody>
+      </p:sp>
+      <p:sp>
+        <p:nvSpPr>
+          <p:cNvPr id="5" name="Content Placeholder 4">
+            <a:extLst>
+              <a:ext uri="{FF2B5EF4-FFF2-40B4-BE49-F238E27FC236}">
+                <a16:creationId xmlns:a16="http://schemas.microsoft.com/office/drawing/2014/main" id="{CA5066AD-2BFC-4153-A603-524464379A8E}"/>
+              </a:ext>
+            </a:extLst>
+          </p:cNvPr>
+          <p:cNvSpPr>
+            <a:spLocks noGrp="1"/>
+          </p:cNvSpPr>
+          <p:nvPr>
+            <p:ph idx="1"/>
+          </p:nvPr>
+        </p:nvSpPr>
+        <p:spPr>
+          <a:xfrm>
+            <a:off x="4683211" y="1460148"/>
+            <a:ext cx="7237971" cy="2345733"/>
+          </a:xfrm>
+        </p:spPr>
+        <p:txBody>
+          <a:bodyPr>
+            <a:normAutofit/>
+          </a:bodyPr>
+          <a:lstStyle/>
+          <a:p>
+            <a:pPr marL="0" indent="0">
+              <a:lnSpc>
+                <a:spcPct val="100000"/>
+              </a:lnSpc>
+              <a:spcBef>
+                <a:spcPts val="0"/>
+              </a:spcBef>
+              <a:buNone/>
+            </a:pPr>
+            <a:r>
+              <a:rPr lang="en-US" sz="1200" dirty="0" err="1">
+                <a:latin typeface="Courier New" panose="02070309020205020404" pitchFamily="49" charset="0"/>
+                <a:cs typeface="Courier New" panose="02070309020205020404" pitchFamily="49" charset="0"/>
+              </a:rPr>
+              <a:t>decals_pairs</a:t>
+            </a:r>
+            <a:r>
+              <a:rPr lang="en-US" sz="1200" dirty="0">
+                <a:latin typeface="Courier New" panose="02070309020205020404" pitchFamily="49" charset="0"/>
+                <a:cs typeface="Courier New" panose="02070309020205020404" pitchFamily="49" charset="0"/>
+              </a:rPr>
+              <a:t> = {</a:t>
+            </a:r>
+          </a:p>
+          <a:p>
+            <a:pPr marL="0" indent="0">
+              <a:lnSpc>
+                <a:spcPct val="100000"/>
+              </a:lnSpc>
+              <a:spcBef>
+                <a:spcPts val="0"/>
+              </a:spcBef>
+              <a:buNone/>
+              <a:tabLst>
+                <a:tab pos="228600" algn="l"/>
+              </a:tabLst>
+            </a:pPr>
+            <a:r>
+              <a:rPr lang="en-US" sz="1200" dirty="0">
+                <a:latin typeface="Courier New" panose="02070309020205020404" pitchFamily="49" charset="0"/>
+                <a:cs typeface="Courier New" panose="02070309020205020404" pitchFamily="49" charset="0"/>
+              </a:rPr>
+              <a:t>	'smooth-or-featured': ['smooth', 'featured-or-disk', 'artifact'],</a:t>
+            </a:r>
+          </a:p>
+          <a:p>
+            <a:pPr marL="0" indent="0">
+              <a:lnSpc>
+                <a:spcPct val="100000"/>
+              </a:lnSpc>
+              <a:spcBef>
+                <a:spcPts val="0"/>
+              </a:spcBef>
+              <a:buNone/>
+              <a:tabLst>
+                <a:tab pos="228600" algn="l"/>
+              </a:tabLst>
+            </a:pPr>
+            <a:r>
+              <a:rPr lang="en-US" sz="1200" dirty="0">
+                <a:latin typeface="Courier New" panose="02070309020205020404" pitchFamily="49" charset="0"/>
+                <a:cs typeface="Courier New" panose="02070309020205020404" pitchFamily="49" charset="0"/>
+              </a:rPr>
+              <a:t>	'disk-edge-on': ['yes', 'no'],</a:t>
+            </a:r>
+          </a:p>
+          <a:p>
+            <a:pPr marL="0" indent="0">
+              <a:lnSpc>
+                <a:spcPct val="100000"/>
+              </a:lnSpc>
+              <a:spcBef>
+                <a:spcPts val="0"/>
+              </a:spcBef>
+              <a:buNone/>
+              <a:tabLst>
+                <a:tab pos="228600" algn="l"/>
+              </a:tabLst>
+            </a:pPr>
+            <a:r>
+              <a:rPr lang="en-US" sz="1200" dirty="0">
+                <a:latin typeface="Courier New" panose="02070309020205020404" pitchFamily="49" charset="0"/>
+                <a:cs typeface="Courier New" panose="02070309020205020404" pitchFamily="49" charset="0"/>
+              </a:rPr>
+              <a:t>	'has-spiral-arms': ['yes', 'no'],</a:t>
+            </a:r>
+          </a:p>
+          <a:p>
+            <a:pPr marL="0" indent="0">
+              <a:lnSpc>
+                <a:spcPct val="100000"/>
+              </a:lnSpc>
+              <a:spcBef>
+                <a:spcPts val="0"/>
+              </a:spcBef>
+              <a:buNone/>
+              <a:tabLst>
+                <a:tab pos="228600" algn="l"/>
+              </a:tabLst>
+            </a:pPr>
+            <a:r>
+              <a:rPr lang="en-US" sz="1200" dirty="0">
+                <a:latin typeface="Courier New" panose="02070309020205020404" pitchFamily="49" charset="0"/>
+                <a:cs typeface="Courier New" panose="02070309020205020404" pitchFamily="49" charset="0"/>
+              </a:rPr>
+              <a:t>	'bar': ['strong', 'weak', 'no'],</a:t>
+            </a:r>
+          </a:p>
+          <a:p>
+            <a:pPr marL="0" indent="0">
+              <a:lnSpc>
+                <a:spcPct val="100000"/>
+              </a:lnSpc>
+              <a:spcBef>
+                <a:spcPts val="0"/>
+              </a:spcBef>
+              <a:buNone/>
+              <a:tabLst>
+                <a:tab pos="228600" algn="l"/>
+              </a:tabLst>
+            </a:pPr>
+            <a:r>
+              <a:rPr lang="en-US" sz="1200" dirty="0">
+                <a:latin typeface="Courier New" panose="02070309020205020404" pitchFamily="49" charset="0"/>
+                <a:cs typeface="Courier New" panose="02070309020205020404" pitchFamily="49" charset="0"/>
+              </a:rPr>
+              <a:t>	'bulge-size': ['dominant', 'large', 'moderate', 'small', 'none'],</a:t>
+            </a:r>
+          </a:p>
+          <a:p>
+            <a:pPr marL="0" indent="0">
+              <a:lnSpc>
+                <a:spcPct val="100000"/>
+              </a:lnSpc>
+              <a:spcBef>
+                <a:spcPts val="0"/>
+              </a:spcBef>
+              <a:buNone/>
+              <a:tabLst>
+                <a:tab pos="228600" algn="l"/>
+              </a:tabLst>
+            </a:pPr>
+            <a:r>
+              <a:rPr lang="en-US" sz="1200" dirty="0">
+                <a:latin typeface="Courier New" panose="02070309020205020404" pitchFamily="49" charset="0"/>
+                <a:cs typeface="Courier New" panose="02070309020205020404" pitchFamily="49" charset="0"/>
+              </a:rPr>
+              <a:t>	'how-rounded': ['round', 'in-between', 'cigar-shaped'],</a:t>
+            </a:r>
+          </a:p>
+          <a:p>
+            <a:pPr marL="0" indent="0">
+              <a:lnSpc>
+                <a:spcPct val="100000"/>
+              </a:lnSpc>
+              <a:spcBef>
+                <a:spcPts val="0"/>
+              </a:spcBef>
+              <a:buNone/>
+              <a:tabLst>
+                <a:tab pos="228600" algn="l"/>
+              </a:tabLst>
+            </a:pPr>
+            <a:r>
+              <a:rPr lang="en-US" sz="1200" dirty="0">
+                <a:latin typeface="Courier New" panose="02070309020205020404" pitchFamily="49" charset="0"/>
+                <a:cs typeface="Courier New" panose="02070309020205020404" pitchFamily="49" charset="0"/>
+              </a:rPr>
+              <a:t>	'edge-on-bulge': ['boxy', 'none', 'rounded'],</a:t>
+            </a:r>
+          </a:p>
+          <a:p>
+            <a:pPr marL="0" indent="0">
+              <a:lnSpc>
+                <a:spcPct val="100000"/>
+              </a:lnSpc>
+              <a:spcBef>
+                <a:spcPts val="0"/>
+              </a:spcBef>
+              <a:buNone/>
+              <a:tabLst>
+                <a:tab pos="228600" algn="l"/>
+              </a:tabLst>
+            </a:pPr>
+            <a:r>
+              <a:rPr lang="en-US" sz="1200" dirty="0">
+                <a:latin typeface="Courier New" panose="02070309020205020404" pitchFamily="49" charset="0"/>
+                <a:cs typeface="Courier New" panose="02070309020205020404" pitchFamily="49" charset="0"/>
+              </a:rPr>
+              <a:t>	'spiral-winding': ['tight', 'medium', 'loose'],</a:t>
+            </a:r>
+          </a:p>
+          <a:p>
+            <a:pPr marL="0" indent="0">
+              <a:lnSpc>
+                <a:spcPct val="100000"/>
+              </a:lnSpc>
+              <a:spcBef>
+                <a:spcPts val="0"/>
+              </a:spcBef>
+              <a:buNone/>
+              <a:tabLst>
+                <a:tab pos="228600" algn="l"/>
+              </a:tabLst>
+            </a:pPr>
+            <a:r>
+              <a:rPr lang="en-US" sz="1200" dirty="0">
+                <a:latin typeface="Courier New" panose="02070309020205020404" pitchFamily="49" charset="0"/>
+                <a:cs typeface="Courier New" panose="02070309020205020404" pitchFamily="49" charset="0"/>
+              </a:rPr>
+              <a:t>	'spiral-arm-count': ['1', '2', '3', '4', 'more-than-4', 'cant-tell'],</a:t>
+            </a:r>
+          </a:p>
+          <a:p>
+            <a:pPr marL="0" indent="0">
+              <a:lnSpc>
+                <a:spcPct val="100000"/>
+              </a:lnSpc>
+              <a:spcBef>
+                <a:spcPts val="0"/>
+              </a:spcBef>
+              <a:buNone/>
+              <a:tabLst>
+                <a:tab pos="228600" algn="l"/>
+              </a:tabLst>
+            </a:pPr>
+            <a:r>
+              <a:rPr lang="en-US" sz="1200" dirty="0">
+                <a:latin typeface="Courier New" panose="02070309020205020404" pitchFamily="49" charset="0"/>
+                <a:cs typeface="Courier New" panose="02070309020205020404" pitchFamily="49" charset="0"/>
+              </a:rPr>
+              <a:t>	'merging': ['none', 'minor-disturbance', 'major-disturbance', 'merger']</a:t>
+            </a:r>
+          </a:p>
+          <a:p>
+            <a:pPr marL="0" indent="0">
+              <a:lnSpc>
+                <a:spcPct val="100000"/>
+              </a:lnSpc>
+              <a:spcBef>
+                <a:spcPts val="0"/>
+              </a:spcBef>
+              <a:buNone/>
+            </a:pPr>
+            <a:r>
+              <a:rPr lang="en-US" sz="1200" dirty="0">
+                <a:latin typeface="Courier New" panose="02070309020205020404" pitchFamily="49" charset="0"/>
+                <a:cs typeface="Courier New" panose="02070309020205020404" pitchFamily="49" charset="0"/>
+              </a:rPr>
+              <a:t>}</a:t>
+            </a:r>
+          </a:p>
+        </p:txBody>
+      </p:sp>
+      <p:sp>
+        <p:nvSpPr>
+          <p:cNvPr id="6" name="Slide Number Placeholder 3">
+            <a:extLst>
+              <a:ext uri="{FF2B5EF4-FFF2-40B4-BE49-F238E27FC236}">
+                <a16:creationId xmlns:a16="http://schemas.microsoft.com/office/drawing/2014/main" id="{E51AF25F-4637-4CEC-A64B-6DF9E1BB83E0}"/>
+              </a:ext>
+            </a:extLst>
+          </p:cNvPr>
+          <p:cNvSpPr>
+            <a:spLocks noGrp="1"/>
+          </p:cNvSpPr>
+          <p:nvPr>
+            <p:ph type="sldNum" sz="quarter" idx="12"/>
+          </p:nvPr>
+        </p:nvSpPr>
+        <p:spPr>
+          <a:xfrm>
+            <a:off x="9321114" y="6399598"/>
+            <a:ext cx="2743200" cy="365125"/>
+          </a:xfrm>
+        </p:spPr>
+        <p:txBody>
+          <a:bodyPr/>
+          <a:lstStyle/>
+          <a:p>
+            <a:fld id="{0F279EFA-F838-4CBF-8D1B-AFE8783F1096}" type="slidenum">
+              <a:rPr lang="en-US" sz="1400" b="1" smtClean="0"/>
+              <a:t>7</a:t>
+            </a:fld>
+            <a:endParaRPr lang="en-US" sz="1400" b="1" dirty="0"/>
+          </a:p>
+        </p:txBody>
+      </p:sp>
+      <p:pic>
+        <p:nvPicPr>
+          <p:cNvPr id="7" name="Content Placeholder 4" descr="Diagram&#10;&#10;Description automatically generated with low confidence">
+            <a:extLst>
+              <a:ext uri="{FF2B5EF4-FFF2-40B4-BE49-F238E27FC236}">
+                <a16:creationId xmlns:a16="http://schemas.microsoft.com/office/drawing/2014/main" id="{2545E885-DD77-4A8D-BB48-30457674F1A9}"/>
+              </a:ext>
+            </a:extLst>
+          </p:cNvPr>
+          <p:cNvPicPr>
+            <a:picLocks noChangeAspect="1"/>
+          </p:cNvPicPr>
+          <p:nvPr/>
+        </p:nvPicPr>
+        <p:blipFill>
+          <a:blip r:embed="rId2">
+            <a:extLst>
+              <a:ext uri="{28A0092B-C50C-407E-A947-70E740481C1C}">
+                <a14:useLocalDpi xmlns:a14="http://schemas.microsoft.com/office/drawing/2010/main" val="0"/>
+              </a:ext>
+            </a:extLst>
+          </a:blip>
+          <a:stretch>
+            <a:fillRect/>
+          </a:stretch>
+        </p:blipFill>
+        <p:spPr>
+          <a:xfrm>
+            <a:off x="401171" y="1349016"/>
+            <a:ext cx="3936049" cy="5318429"/>
+          </a:xfrm>
+          <a:prstGeom prst="rect">
+            <a:avLst/>
+          </a:prstGeom>
+        </p:spPr>
+      </p:pic>
+      <p:sp>
+        <p:nvSpPr>
+          <p:cNvPr id="2" name="TextBox 1">
+            <a:extLst>
+              <a:ext uri="{FF2B5EF4-FFF2-40B4-BE49-F238E27FC236}">
+                <a16:creationId xmlns:a16="http://schemas.microsoft.com/office/drawing/2014/main" id="{1060DC70-A528-4620-9CA4-BA99A9303EE5}"/>
+              </a:ext>
+            </a:extLst>
+          </p:cNvPr>
+          <p:cNvSpPr txBox="1"/>
+          <p:nvPr/>
+        </p:nvSpPr>
+        <p:spPr>
+          <a:xfrm>
+            <a:off x="4738818" y="3953718"/>
+            <a:ext cx="6425513" cy="2539157"/>
+          </a:xfrm>
+          <a:prstGeom prst="rect">
+            <a:avLst/>
+          </a:prstGeom>
+          <a:noFill/>
+        </p:spPr>
+        <p:txBody>
+          <a:bodyPr wrap="square" rtlCol="0">
+            <a:spAutoFit/>
+          </a:bodyPr>
+          <a:lstStyle/>
+          <a:p>
+            <a:pPr marL="285750" indent="-285750">
+              <a:spcAft>
+                <a:spcPts val="600"/>
+              </a:spcAft>
+              <a:buFont typeface="Arial" panose="020B0604020202020204" pitchFamily="34" charset="0"/>
+              <a:buChar char="•"/>
+            </a:pPr>
+            <a:r>
+              <a:rPr lang="en-US" sz="2400" b="1" dirty="0"/>
+              <a:t>10</a:t>
+            </a:r>
+            <a:r>
+              <a:rPr lang="en-US" sz="2400" dirty="0"/>
+              <a:t> Questions</a:t>
+            </a:r>
+          </a:p>
+          <a:p>
+            <a:pPr marL="285750" indent="-285750">
+              <a:spcAft>
+                <a:spcPts val="600"/>
+              </a:spcAft>
+              <a:buFont typeface="Arial" panose="020B0604020202020204" pitchFamily="34" charset="0"/>
+              <a:buChar char="•"/>
+            </a:pPr>
+            <a:r>
+              <a:rPr lang="en-US" sz="2400" b="1" dirty="0"/>
+              <a:t>34</a:t>
+            </a:r>
+            <a:r>
+              <a:rPr lang="en-US" sz="2400" dirty="0"/>
+              <a:t> possible answers</a:t>
+            </a:r>
+          </a:p>
+          <a:p>
+            <a:pPr marL="285750" indent="-285750">
+              <a:spcAft>
+                <a:spcPts val="600"/>
+              </a:spcAft>
+              <a:buFont typeface="Arial" panose="020B0604020202020204" pitchFamily="34" charset="0"/>
+              <a:buChar char="•"/>
+            </a:pPr>
+            <a:r>
+              <a:rPr lang="en-US" sz="2400" dirty="0"/>
+              <a:t>Model is trying to predict probability of getting each answer  </a:t>
+            </a:r>
+            <a:r>
+              <a:rPr lang="en-US" sz="2400" i="1" dirty="0"/>
+              <a:t>(Bayesian posterior)</a:t>
+            </a:r>
+          </a:p>
+          <a:p>
+            <a:pPr marL="285750" indent="-285750">
+              <a:spcAft>
+                <a:spcPts val="600"/>
+              </a:spcAft>
+              <a:buFont typeface="Arial" panose="020B0604020202020204" pitchFamily="34" charset="0"/>
+              <a:buChar char="•"/>
+            </a:pPr>
+            <a:r>
+              <a:rPr lang="en-US" sz="2400" b="1" dirty="0"/>
+              <a:t>Output is a 34-element array of numbers between 0 - 1</a:t>
+            </a:r>
+          </a:p>
+        </p:txBody>
+      </p:sp>
+    </p:spTree>
+    <p:extLst>
+      <p:ext uri="{BB962C8B-B14F-4D97-AF65-F5344CB8AC3E}">
         <p14:creationId xmlns:p14="http://schemas.microsoft.com/office/powerpoint/2010/main" val="4183382144"/>
+      </p:ext>
+    </p:extLst>
+  </p:cSld>
+  <p:clrMapOvr>
+    <a:masterClrMapping/>
+  </p:clrMapOvr>
+</p:sld>
+</file>
+
+<file path=ppt/slides/slide8.xml><?xml version="1.0" encoding="utf-8"?>
+<p:sld xmlns:a="http://schemas.openxmlformats.org/drawingml/2006/main" xmlns:r="http://schemas.openxmlformats.org/officeDocument/2006/relationships" xmlns:p="http://schemas.openxmlformats.org/presentationml/2006/main">
+  <p:cSld>
+    <p:spTree>
+      <p:nvGrpSpPr>
+        <p:cNvPr id="1" name=""/>
+        <p:cNvGrpSpPr/>
+        <p:nvPr/>
+      </p:nvGrpSpPr>
+      <p:grpSpPr>
+        <a:xfrm>
+          <a:off x="0" y="0"/>
+          <a:ext cx="0" cy="0"/>
+          <a:chOff x="0" y="0"/>
+          <a:chExt cx="0" cy="0"/>
+        </a:xfrm>
+      </p:grpSpPr>
+      <p:sp>
+        <p:nvSpPr>
+          <p:cNvPr id="2" name="Title 1">
+            <a:extLst>
+              <a:ext uri="{FF2B5EF4-FFF2-40B4-BE49-F238E27FC236}">
+                <a16:creationId xmlns:a16="http://schemas.microsoft.com/office/drawing/2014/main" id="{5087B189-BD48-47BC-B463-1A01078EFEE3}"/>
+              </a:ext>
+            </a:extLst>
+          </p:cNvPr>
+          <p:cNvSpPr>
+            <a:spLocks noGrp="1"/>
+          </p:cNvSpPr>
+          <p:nvPr>
+            <p:ph type="title"/>
+          </p:nvPr>
+        </p:nvSpPr>
+        <p:spPr/>
+        <p:txBody>
+          <a:bodyPr/>
+          <a:lstStyle/>
+          <a:p>
+            <a:r>
+              <a:rPr lang="en-US" dirty="0"/>
+              <a:t>Hardware and Runtime Environments</a:t>
+            </a:r>
+          </a:p>
+        </p:txBody>
+      </p:sp>
+      <p:sp>
+        <p:nvSpPr>
+          <p:cNvPr id="3" name="Content Placeholder 2">
+            <a:extLst>
+              <a:ext uri="{FF2B5EF4-FFF2-40B4-BE49-F238E27FC236}">
+                <a16:creationId xmlns:a16="http://schemas.microsoft.com/office/drawing/2014/main" id="{DE84D164-140A-462A-87B6-314D8C5C9983}"/>
+              </a:ext>
+            </a:extLst>
+          </p:cNvPr>
+          <p:cNvSpPr>
+            <a:spLocks noGrp="1"/>
+          </p:cNvSpPr>
+          <p:nvPr>
+            <p:ph idx="1"/>
+          </p:nvPr>
+        </p:nvSpPr>
+        <p:spPr/>
+        <p:txBody>
+          <a:bodyPr/>
+          <a:lstStyle/>
+          <a:p>
+            <a:r>
+              <a:rPr lang="en-US" dirty="0"/>
+              <a:t>Any 2GB GPU (GTX 1050, MX 230)</a:t>
+            </a:r>
+          </a:p>
+          <a:p>
+            <a:pPr lvl="1"/>
+            <a:r>
+              <a:rPr lang="en-US" dirty="0"/>
+              <a:t>Immediate out-of-memory error (for virtually anything)</a:t>
+            </a:r>
+          </a:p>
+          <a:p>
+            <a:pPr>
+              <a:spcBef>
+                <a:spcPts val="1800"/>
+              </a:spcBef>
+            </a:pPr>
+            <a:r>
+              <a:rPr lang="en-US" dirty="0"/>
+              <a:t>6GB GTX 1660</a:t>
+            </a:r>
+          </a:p>
+          <a:p>
+            <a:pPr lvl="1"/>
+            <a:r>
+              <a:rPr lang="en-US" dirty="0"/>
+              <a:t>$450, old but compatible with my Linux PC</a:t>
+            </a:r>
+          </a:p>
+          <a:p>
+            <a:pPr lvl="1"/>
+            <a:r>
+              <a:rPr lang="en-US" dirty="0"/>
+              <a:t>Good for debugging</a:t>
+            </a:r>
+          </a:p>
+          <a:p>
+            <a:pPr lvl="1"/>
+            <a:r>
+              <a:rPr lang="en-US" dirty="0"/>
+              <a:t>Limited capability for training</a:t>
+            </a:r>
+          </a:p>
+          <a:p>
+            <a:pPr>
+              <a:spcBef>
+                <a:spcPts val="1800"/>
+              </a:spcBef>
+            </a:pPr>
+            <a:r>
+              <a:rPr lang="en-US" dirty="0" err="1"/>
+              <a:t>Colab</a:t>
+            </a:r>
+            <a:r>
+              <a:rPr lang="en-US" dirty="0"/>
+              <a:t> Pro+ with 16GB Tesla V100</a:t>
+            </a:r>
+          </a:p>
+          <a:p>
+            <a:pPr lvl="1"/>
+            <a:r>
+              <a:rPr lang="en-US" dirty="0"/>
+              <a:t>Can train at recommended batch size</a:t>
+            </a:r>
+          </a:p>
+          <a:p>
+            <a:pPr>
+              <a:spcBef>
+                <a:spcPts val="1800"/>
+              </a:spcBef>
+            </a:pPr>
+            <a:r>
+              <a:rPr lang="en-US" dirty="0"/>
+              <a:t>AWS?</a:t>
+            </a:r>
+          </a:p>
+          <a:p>
+            <a:pPr lvl="1"/>
+            <a:r>
+              <a:rPr lang="en-US" dirty="0"/>
+              <a:t>Will try this later</a:t>
+            </a:r>
+          </a:p>
+        </p:txBody>
+      </p:sp>
+    </p:spTree>
+    <p:extLst>
+      <p:ext uri="{BB962C8B-B14F-4D97-AF65-F5344CB8AC3E}">
+        <p14:creationId xmlns:p14="http://schemas.microsoft.com/office/powerpoint/2010/main" val="1540789204"/>
+      </p:ext>
+    </p:extLst>
+  </p:cSld>
+  <p:clrMapOvr>
+    <a:masterClrMapping/>
+  </p:clrMapOvr>
+</p:sld>
+</file>
+
+<file path=ppt/slides/slide9.xml><?xml version="1.0" encoding="utf-8"?>
+<p:sld xmlns:a="http://schemas.openxmlformats.org/drawingml/2006/main" xmlns:r="http://schemas.openxmlformats.org/officeDocument/2006/relationships" xmlns:p="http://schemas.openxmlformats.org/presentationml/2006/main">
+  <p:cSld>
+    <p:spTree>
+      <p:nvGrpSpPr>
+        <p:cNvPr id="1" name=""/>
+        <p:cNvGrpSpPr/>
+        <p:nvPr/>
+      </p:nvGrpSpPr>
+      <p:grpSpPr>
+        <a:xfrm>
+          <a:off x="0" y="0"/>
+          <a:ext cx="0" cy="0"/>
+          <a:chOff x="0" y="0"/>
+          <a:chExt cx="0" cy="0"/>
+        </a:xfrm>
+      </p:grpSpPr>
+      <p:sp>
+        <p:nvSpPr>
+          <p:cNvPr id="2" name="Title 1">
+            <a:extLst>
+              <a:ext uri="{FF2B5EF4-FFF2-40B4-BE49-F238E27FC236}">
+                <a16:creationId xmlns:a16="http://schemas.microsoft.com/office/drawing/2014/main" id="{724DA3FA-37D3-436C-9D59-E600F6E5A391}"/>
+              </a:ext>
+            </a:extLst>
+          </p:cNvPr>
+          <p:cNvSpPr>
+            <a:spLocks noGrp="1"/>
+          </p:cNvSpPr>
+          <p:nvPr>
+            <p:ph type="title"/>
+          </p:nvPr>
+        </p:nvSpPr>
+        <p:spPr/>
+        <p:txBody>
+          <a:bodyPr/>
+          <a:lstStyle/>
+          <a:p>
+            <a:r>
+              <a:rPr lang="en-US" dirty="0"/>
+              <a:t>Training with Keras/TensorFlow</a:t>
+            </a:r>
+          </a:p>
+        </p:txBody>
+      </p:sp>
+      <p:sp>
+        <p:nvSpPr>
+          <p:cNvPr id="3" name="Content Placeholder 2">
+            <a:extLst>
+              <a:ext uri="{FF2B5EF4-FFF2-40B4-BE49-F238E27FC236}">
+                <a16:creationId xmlns:a16="http://schemas.microsoft.com/office/drawing/2014/main" id="{C98666D5-EF0C-44D1-BE7D-7B720B0C6A15}"/>
+              </a:ext>
+            </a:extLst>
+          </p:cNvPr>
+          <p:cNvSpPr>
+            <a:spLocks noGrp="1"/>
+          </p:cNvSpPr>
+          <p:nvPr>
+            <p:ph idx="1"/>
+          </p:nvPr>
+        </p:nvSpPr>
+        <p:spPr/>
+        <p:txBody>
+          <a:bodyPr/>
+          <a:lstStyle/>
+          <a:p>
+            <a:endParaRPr lang="en-US"/>
+          </a:p>
+        </p:txBody>
+      </p:sp>
+    </p:spTree>
+    <p:extLst>
+      <p:ext uri="{BB962C8B-B14F-4D97-AF65-F5344CB8AC3E}">
+        <p14:creationId xmlns:p14="http://schemas.microsoft.com/office/powerpoint/2010/main" val="3093047405"/>
       </p:ext>
     </p:extLst>
   </p:cSld>

</xml_diff>

<commit_message>
slides and Illustrator stuff
</commit_message>
<xml_diff>
--- a/project_report/Colin Leach project for ASTR 502.pptx
+++ b/project_report/Colin Leach project for ASTR 502.pptx
@@ -126,7 +126,18 @@
   </p:defaultTextStyle>
   <p:extLst>
     <p:ext uri="{EFAFB233-063F-42B5-8137-9DF3F51BA10A}">
-      <p15:sldGuideLst xmlns:p15="http://schemas.microsoft.com/office/powerpoint/2012/main"/>
+      <p15:sldGuideLst xmlns:p15="http://schemas.microsoft.com/office/powerpoint/2012/main">
+        <p15:guide id="1" orient="horz" pos="2160" userDrawn="1">
+          <p15:clr>
+            <a:srgbClr val="A4A3A4"/>
+          </p15:clr>
+        </p15:guide>
+        <p15:guide id="2" pos="3840" userDrawn="1">
+          <p15:clr>
+            <a:srgbClr val="A4A3A4"/>
+          </p15:clr>
+        </p15:guide>
+      </p15:sldGuideLst>
     </p:ext>
     <p:ext uri="{2D200454-40CA-4A62-9FC3-DE9A4176ACB9}">
       <p15:notesGuideLst xmlns:p15="http://schemas.microsoft.com/office/powerpoint/2012/main"/>
@@ -4426,7 +4437,7 @@
         <p:spPr>
           <a:xfrm>
             <a:off x="364524" y="5851488"/>
-            <a:ext cx="3566233" cy="646331"/>
+            <a:ext cx="3625160" cy="646331"/>
           </a:xfrm>
           <a:prstGeom prst="rect">
             <a:avLst/>
@@ -4455,7 +4466,15 @@
             </a:r>
             <a:r>
               <a:rPr lang="en-US" dirty="0"/>
-              <a:t> good accuracy function available</a:t>
+              <a:t> </a:t>
+            </a:r>
+            <a:r>
+              <a:rPr lang="en-US" b="1" dirty="0">
+                <a:solidFill>
+                  <a:srgbClr val="FF0000"/>
+                </a:solidFill>
+              </a:rPr>
+              <a:t>good accuracy function available</a:t>
             </a:r>
           </a:p>
         </p:txBody>
@@ -4518,28 +4537,152 @@
           </a:p>
         </p:txBody>
       </p:sp>
-      <p:sp>
-        <p:nvSpPr>
-          <p:cNvPr id="3" name="Content Placeholder 2">
-            <a:extLst>
-              <a:ext uri="{FF2B5EF4-FFF2-40B4-BE49-F238E27FC236}">
-                <a16:creationId xmlns:a16="http://schemas.microsoft.com/office/drawing/2014/main" id="{C98666D5-EF0C-44D1-BE7D-7B720B0C6A15}"/>
-              </a:ext>
-            </a:extLst>
-          </p:cNvPr>
-          <p:cNvSpPr>
-            <a:spLocks noGrp="1"/>
-          </p:cNvSpPr>
-          <p:nvPr>
-            <p:ph idx="1"/>
-          </p:nvPr>
-        </p:nvSpPr>
-        <p:spPr/>
-        <p:txBody>
-          <a:bodyPr/>
-          <a:lstStyle/>
-          <a:p>
-            <a:endParaRPr lang="en-US"/>
+      <p:pic>
+        <p:nvPicPr>
+          <p:cNvPr id="5" name="Picture 4">
+            <a:extLst>
+              <a:ext uri="{FF2B5EF4-FFF2-40B4-BE49-F238E27FC236}">
+                <a16:creationId xmlns:a16="http://schemas.microsoft.com/office/drawing/2014/main" id="{6C04C7D3-246D-4D2B-9188-6CB5715AE772}"/>
+              </a:ext>
+            </a:extLst>
+          </p:cNvPr>
+          <p:cNvPicPr>
+            <a:picLocks noChangeAspect="1"/>
+          </p:cNvPicPr>
+          <p:nvPr/>
+        </p:nvPicPr>
+        <p:blipFill>
+          <a:blip r:embed="rId2"/>
+          <a:stretch>
+            <a:fillRect/>
+          </a:stretch>
+        </p:blipFill>
+        <p:spPr>
+          <a:xfrm>
+            <a:off x="440900" y="1236243"/>
+            <a:ext cx="6843715" cy="2332046"/>
+          </a:xfrm>
+          <a:prstGeom prst="rect">
+            <a:avLst/>
+          </a:prstGeom>
+        </p:spPr>
+      </p:pic>
+      <p:pic>
+        <p:nvPicPr>
+          <p:cNvPr id="7" name="Picture 6">
+            <a:extLst>
+              <a:ext uri="{FF2B5EF4-FFF2-40B4-BE49-F238E27FC236}">
+                <a16:creationId xmlns:a16="http://schemas.microsoft.com/office/drawing/2014/main" id="{CAF113A1-BFD9-4BB5-8C32-A77483D3D6A2}"/>
+              </a:ext>
+            </a:extLst>
+          </p:cNvPr>
+          <p:cNvPicPr>
+            <a:picLocks noChangeAspect="1"/>
+          </p:cNvPicPr>
+          <p:nvPr/>
+        </p:nvPicPr>
+        <p:blipFill>
+          <a:blip r:embed="rId3"/>
+          <a:stretch>
+            <a:fillRect/>
+          </a:stretch>
+        </p:blipFill>
+        <p:spPr>
+          <a:xfrm>
+            <a:off x="379116" y="3764373"/>
+            <a:ext cx="6813231" cy="2133898"/>
+          </a:xfrm>
+          <a:prstGeom prst="rect">
+            <a:avLst/>
+          </a:prstGeom>
+        </p:spPr>
+      </p:pic>
+      <p:sp>
+        <p:nvSpPr>
+          <p:cNvPr id="8" name="TextBox 7">
+            <a:extLst>
+              <a:ext uri="{FF2B5EF4-FFF2-40B4-BE49-F238E27FC236}">
+                <a16:creationId xmlns:a16="http://schemas.microsoft.com/office/drawing/2014/main" id="{96F88A68-4AD2-496D-A82C-0CCD24A0D6FF}"/>
+              </a:ext>
+            </a:extLst>
+          </p:cNvPr>
+          <p:cNvSpPr txBox="1"/>
+          <p:nvPr/>
+        </p:nvSpPr>
+        <p:spPr>
+          <a:xfrm>
+            <a:off x="7729151" y="1396314"/>
+            <a:ext cx="4021949" cy="4108817"/>
+          </a:xfrm>
+          <a:prstGeom prst="rect">
+            <a:avLst/>
+          </a:prstGeom>
+          <a:noFill/>
+        </p:spPr>
+        <p:txBody>
+          <a:bodyPr wrap="square" rtlCol="0">
+            <a:spAutoFit/>
+          </a:bodyPr>
+          <a:lstStyle/>
+          <a:p>
+            <a:pPr marL="285750" indent="-285750">
+              <a:spcAft>
+                <a:spcPts val="1800"/>
+              </a:spcAft>
+              <a:buFont typeface="Wingdings" panose="05000000000000000000" pitchFamily="2" charset="2"/>
+              <a:buChar char="§"/>
+            </a:pPr>
+            <a:r>
+              <a:rPr lang="en-US" sz="2400" dirty="0"/>
+              <a:t>Started with batch size 128, kept halving until training ran without OOM errors</a:t>
+            </a:r>
+          </a:p>
+          <a:p>
+            <a:pPr marL="285750" indent="-285750">
+              <a:spcAft>
+                <a:spcPts val="1800"/>
+              </a:spcAft>
+              <a:buFont typeface="Wingdings" panose="05000000000000000000" pitchFamily="2" charset="2"/>
+              <a:buChar char="§"/>
+            </a:pPr>
+            <a:r>
+              <a:rPr lang="en-US" sz="2400" dirty="0"/>
+              <a:t>Worked consistently better with </a:t>
+            </a:r>
+            <a:r>
+              <a:rPr lang="en-US" sz="2400" dirty="0" err="1"/>
+              <a:t>DECaLS</a:t>
+            </a:r>
+            <a:r>
+              <a:rPr lang="en-US" sz="2400" dirty="0"/>
+              <a:t> than GZ2</a:t>
+            </a:r>
+          </a:p>
+          <a:p>
+            <a:pPr marL="285750" indent="-285750">
+              <a:spcAft>
+                <a:spcPts val="1800"/>
+              </a:spcAft>
+              <a:buFont typeface="Wingdings" panose="05000000000000000000" pitchFamily="2" charset="2"/>
+              <a:buChar char="§"/>
+            </a:pPr>
+            <a:r>
+              <a:rPr lang="en-US" sz="2400" dirty="0"/>
+              <a:t>Matching batch size only makes GZ2 worse</a:t>
+            </a:r>
+          </a:p>
+          <a:p>
+            <a:pPr marL="285750" indent="-285750">
+              <a:spcAft>
+                <a:spcPts val="1800"/>
+              </a:spcAft>
+              <a:buFont typeface="Wingdings" panose="05000000000000000000" pitchFamily="2" charset="2"/>
+              <a:buChar char="§"/>
+            </a:pPr>
+            <a:r>
+              <a:rPr lang="en-US" sz="2400" dirty="0"/>
+              <a:t>Time to take another look at image quality?</a:t>
+            </a:r>
           </a:p>
         </p:txBody>
       </p:sp>
@@ -4849,7 +4992,23 @@
                   <a:srgbClr val="FF0000"/>
                 </a:solidFill>
               </a:rPr>
-              <a:t>Garbage in, Garbage out – a very old idea</a:t>
+              <a:t>Garbage in, Garbage out – a </a:t>
+            </a:r>
+            <a:r>
+              <a:rPr lang="en-US" sz="2800" b="1" i="1" dirty="0">
+                <a:solidFill>
+                  <a:srgbClr val="FF0000"/>
+                </a:solidFill>
+              </a:rPr>
+              <a:t>very</a:t>
+            </a:r>
+            <a:r>
+              <a:rPr lang="en-US" sz="2800" b="1" dirty="0">
+                <a:solidFill>
+                  <a:srgbClr val="FF0000"/>
+                </a:solidFill>
+              </a:rPr>
+              <a:t> old idea</a:t>
             </a:r>
           </a:p>
         </p:txBody>
@@ -4933,15 +5092,194 @@
             <p:ph idx="1"/>
           </p:nvPr>
         </p:nvSpPr>
-        <p:spPr/>
-        <p:txBody>
-          <a:bodyPr/>
-          <a:lstStyle/>
-          <a:p>
-            <a:endParaRPr lang="en-US"/>
-          </a:p>
-        </p:txBody>
-      </p:sp>
+        <p:spPr>
+          <a:xfrm>
+            <a:off x="4919985" y="1259085"/>
+            <a:ext cx="6627404" cy="3056017"/>
+          </a:xfrm>
+        </p:spPr>
+        <p:txBody>
+          <a:bodyPr>
+            <a:normAutofit/>
+          </a:bodyPr>
+          <a:lstStyle/>
+          <a:p>
+            <a:r>
+              <a:rPr lang="en-US" sz="2400" dirty="0"/>
+              <a:t>All files stored on Drive</a:t>
+            </a:r>
+          </a:p>
+          <a:p>
+            <a:r>
+              <a:rPr lang="en-US" sz="2400" dirty="0"/>
+              <a:t>Training takes &gt;12h on a V100, so eventually upgraded to </a:t>
+            </a:r>
+            <a:r>
+              <a:rPr lang="en-US" sz="2400" dirty="0" err="1"/>
+              <a:t>Colab</a:t>
+            </a:r>
+            <a:r>
+              <a:rPr lang="en-US" sz="2400" dirty="0"/>
+              <a:t> Pro+</a:t>
+            </a:r>
+          </a:p>
+          <a:p>
+            <a:r>
+              <a:rPr lang="en-US" sz="2400" dirty="0"/>
+              <a:t>Even a 16GB GPU nearly ran out of memory</a:t>
+            </a:r>
+          </a:p>
+          <a:p>
+            <a:r>
+              <a:rPr lang="en-US" sz="2400" dirty="0"/>
+              <a:t>Results are a bit better than on my home PC, not as much as hoped for</a:t>
+            </a:r>
+          </a:p>
+        </p:txBody>
+      </p:sp>
+      <p:pic>
+        <p:nvPicPr>
+          <p:cNvPr id="5" name="Picture 4" descr="Chart, histogram&#10;&#10;Description automatically generated">
+            <a:extLst>
+              <a:ext uri="{FF2B5EF4-FFF2-40B4-BE49-F238E27FC236}">
+                <a16:creationId xmlns:a16="http://schemas.microsoft.com/office/drawing/2014/main" id="{097475AC-CC5B-4B47-8842-E43B8CE2FBA1}"/>
+              </a:ext>
+            </a:extLst>
+          </p:cNvPr>
+          <p:cNvPicPr>
+            <a:picLocks noChangeAspect="1"/>
+          </p:cNvPicPr>
+          <p:nvPr/>
+        </p:nvPicPr>
+        <p:blipFill>
+          <a:blip r:embed="rId2">
+            <a:extLst>
+              <a:ext uri="{28A0092B-C50C-407E-A947-70E740481C1C}">
+                <a14:useLocalDpi xmlns:a14="http://schemas.microsoft.com/office/drawing/2010/main" val="0"/>
+              </a:ext>
+            </a:extLst>
+          </a:blip>
+          <a:stretch>
+            <a:fillRect/>
+          </a:stretch>
+        </p:blipFill>
+        <p:spPr>
+          <a:xfrm>
+            <a:off x="790157" y="1172150"/>
+            <a:ext cx="3103317" cy="2231898"/>
+          </a:xfrm>
+          <a:prstGeom prst="rect">
+            <a:avLst/>
+          </a:prstGeom>
+        </p:spPr>
+      </p:pic>
+      <p:pic>
+        <p:nvPicPr>
+          <p:cNvPr id="9" name="Picture 8" descr="Chart, histogram&#10;&#10;Description automatically generated">
+            <a:extLst>
+              <a:ext uri="{FF2B5EF4-FFF2-40B4-BE49-F238E27FC236}">
+                <a16:creationId xmlns:a16="http://schemas.microsoft.com/office/drawing/2014/main" id="{966999F0-F8B8-4F77-92C5-91E3E6778565}"/>
+              </a:ext>
+            </a:extLst>
+          </p:cNvPr>
+          <p:cNvPicPr>
+            <a:picLocks noChangeAspect="1"/>
+          </p:cNvPicPr>
+          <p:nvPr/>
+        </p:nvPicPr>
+        <p:blipFill>
+          <a:blip r:embed="rId3">
+            <a:extLst>
+              <a:ext uri="{28A0092B-C50C-407E-A947-70E740481C1C}">
+                <a14:useLocalDpi xmlns:a14="http://schemas.microsoft.com/office/drawing/2010/main" val="0"/>
+              </a:ext>
+            </a:extLst>
+          </a:blip>
+          <a:stretch>
+            <a:fillRect/>
+          </a:stretch>
+        </p:blipFill>
+        <p:spPr>
+          <a:xfrm>
+            <a:off x="723231" y="3862032"/>
+            <a:ext cx="3049965" cy="2240790"/>
+          </a:xfrm>
+          <a:prstGeom prst="rect">
+            <a:avLst/>
+          </a:prstGeom>
+        </p:spPr>
+      </p:pic>
+      <p:pic>
+        <p:nvPicPr>
+          <p:cNvPr id="13" name="Picture 12" descr="Diagram&#10;&#10;Description automatically generated">
+            <a:extLst>
+              <a:ext uri="{FF2B5EF4-FFF2-40B4-BE49-F238E27FC236}">
+                <a16:creationId xmlns:a16="http://schemas.microsoft.com/office/drawing/2014/main" id="{1A059528-BD06-483C-B978-E98959C45C78}"/>
+              </a:ext>
+            </a:extLst>
+          </p:cNvPr>
+          <p:cNvPicPr>
+            <a:picLocks noChangeAspect="1"/>
+          </p:cNvPicPr>
+          <p:nvPr/>
+        </p:nvPicPr>
+        <p:blipFill>
+          <a:blip r:embed="rId4">
+            <a:extLst>
+              <a:ext uri="{28A0092B-C50C-407E-A947-70E740481C1C}">
+                <a14:useLocalDpi xmlns:a14="http://schemas.microsoft.com/office/drawing/2010/main" val="0"/>
+              </a:ext>
+            </a:extLst>
+          </a:blip>
+          <a:stretch>
+            <a:fillRect/>
+          </a:stretch>
+        </p:blipFill>
+        <p:spPr>
+          <a:xfrm>
+            <a:off x="4197876" y="3981525"/>
+            <a:ext cx="2772162" cy="2238687"/>
+          </a:xfrm>
+          <a:prstGeom prst="rect">
+            <a:avLst/>
+          </a:prstGeom>
+        </p:spPr>
+      </p:pic>
+      <p:pic>
+        <p:nvPicPr>
+          <p:cNvPr id="11" name="Picture 10" descr="Table&#10;&#10;Description automatically generated">
+            <a:extLst>
+              <a:ext uri="{FF2B5EF4-FFF2-40B4-BE49-F238E27FC236}">
+                <a16:creationId xmlns:a16="http://schemas.microsoft.com/office/drawing/2014/main" id="{EE837F91-5E9C-4E62-818E-0CB75DF0EE5F}"/>
+              </a:ext>
+            </a:extLst>
+          </p:cNvPr>
+          <p:cNvPicPr>
+            <a:picLocks noChangeAspect="1"/>
+          </p:cNvPicPr>
+          <p:nvPr/>
+        </p:nvPicPr>
+        <p:blipFill rotWithShape="1">
+          <a:blip r:embed="rId5">
+            <a:extLst>
+              <a:ext uri="{28A0092B-C50C-407E-A947-70E740481C1C}">
+                <a14:useLocalDpi xmlns:a14="http://schemas.microsoft.com/office/drawing/2010/main" val="0"/>
+              </a:ext>
+            </a:extLst>
+          </a:blip>
+          <a:srcRect t="33498" b="-7330"/>
+          <a:stretch/>
+        </p:blipFill>
+        <p:spPr>
+          <a:xfrm>
+            <a:off x="5638170" y="5417837"/>
+            <a:ext cx="5620534" cy="914400"/>
+          </a:xfrm>
+          <a:prstGeom prst="rect">
+            <a:avLst/>
+          </a:prstGeom>
+        </p:spPr>
+      </p:pic>
     </p:spTree>
     <p:extLst>
       <p:ext uri="{BB962C8B-B14F-4D97-AF65-F5344CB8AC3E}">
@@ -5021,7 +5359,19 @@
           <a:bodyPr/>
           <a:lstStyle/>
           <a:p>
-            <a:endParaRPr lang="en-US"/>
+            <a:r>
+              <a:rPr lang="en-US" dirty="0" err="1">
+                <a:solidFill>
+                  <a:srgbClr val="FF0000"/>
+                </a:solidFill>
+              </a:rPr>
+              <a:t>ToDo</a:t>
+            </a:r>
+            <a:endParaRPr lang="en-US" dirty="0">
+              <a:solidFill>
+                <a:srgbClr val="FF0000"/>
+              </a:solidFill>
+            </a:endParaRPr>
           </a:p>
         </p:txBody>
       </p:sp>
@@ -7137,10 +7487,15 @@
               <a:buChar char="§"/>
             </a:pPr>
             <a:r>
-              <a:rPr lang="en-US" dirty="0" err="1"/>
-              <a:t>url</a:t>
-            </a:r>
-            <a:endParaRPr lang="en-US" dirty="0"/>
+              <a:rPr lang="en-US" dirty="0">
+                <a:hlinkClick r:id="rId2"/>
+              </a:rPr>
+              <a:t>https://zenodo.org/record/4573248</a:t>
+            </a:r>
+            <a:r>
+              <a:rPr lang="en-US" dirty="0"/>
+              <a:t> </a:t>
+            </a:r>
           </a:p>
           <a:p>
             <a:pPr marL="346075" indent="-346075">
@@ -7161,13 +7516,21 @@
               <a:buChar char="§"/>
             </a:pPr>
             <a:r>
-              <a:rPr lang="en-US" dirty="0" err="1"/>
-              <a:t>url</a:t>
-            </a:r>
-            <a:endParaRPr lang="en-US" dirty="0"/>
+              <a:rPr lang="en-US" dirty="0">
+                <a:hlinkClick r:id="rId3"/>
+              </a:rPr>
+              <a:t>https://data.galaxyzoo.org</a:t>
+            </a:r>
+            <a:r>
+              <a:rPr lang="en-US" dirty="0"/>
+              <a:t> </a:t>
+            </a:r>
           </a:p>
           <a:p>
             <a:pPr marL="346075" indent="-346075">
+              <a:spcBef>
+                <a:spcPts val="1800"/>
+              </a:spcBef>
               <a:buFont typeface="Wingdings" panose="05000000000000000000" pitchFamily="2" charset="2"/>
               <a:buChar char="Ø"/>
             </a:pPr>
@@ -7175,6 +7538,24 @@
               <a:rPr lang="en-US" dirty="0"/>
               <a:t>GZ2 images are not made public, need to get them from SDSS</a:t>
             </a:r>
+          </a:p>
+          <a:p>
+            <a:pPr marL="457200" lvl="1" indent="0">
+              <a:buNone/>
+            </a:pPr>
+            <a:endParaRPr lang="en-US" dirty="0"/>
+          </a:p>
+          <a:p>
+            <a:pPr marL="457200" lvl="1" indent="0">
+              <a:buNone/>
+            </a:pPr>
+            <a:endParaRPr lang="en-US" dirty="0"/>
+          </a:p>
+          <a:p>
+            <a:pPr marL="457200" lvl="1" indent="0">
+              <a:buNone/>
+            </a:pPr>
+            <a:endParaRPr lang="en-US" dirty="0"/>
           </a:p>
           <a:p>
             <a:pPr lvl="1">
@@ -7182,19 +7563,200 @@
               <a:buChar char="§"/>
             </a:pPr>
             <a:r>
-              <a:rPr lang="en-US" dirty="0" err="1"/>
-              <a:t>url</a:t>
-            </a:r>
-            <a:endParaRPr lang="en-US" dirty="0"/>
-          </a:p>
-          <a:p>
-            <a:pPr lvl="1">
-              <a:buFont typeface="Wingdings" panose="05000000000000000000" pitchFamily="2" charset="2"/>
-              <a:buChar char="§"/>
+              <a:rPr lang="en-US" dirty="0">
+                <a:solidFill>
+                  <a:srgbClr val="FF0000"/>
+                </a:solidFill>
+              </a:rPr>
+              <a:t>This isn’t the end of the story…</a:t>
+            </a:r>
+          </a:p>
+        </p:txBody>
+      </p:sp>
+      <p:sp>
+        <p:nvSpPr>
+          <p:cNvPr id="5" name="TextBox 4">
+            <a:extLst>
+              <a:ext uri="{FF2B5EF4-FFF2-40B4-BE49-F238E27FC236}">
+                <a16:creationId xmlns:a16="http://schemas.microsoft.com/office/drawing/2014/main" id="{A2A6E577-14BC-41A6-8103-0E3FAA6C3B1F}"/>
+              </a:ext>
+            </a:extLst>
+          </p:cNvPr>
+          <p:cNvSpPr txBox="1"/>
+          <p:nvPr/>
+        </p:nvSpPr>
+        <p:spPr>
+          <a:xfrm>
+            <a:off x="1186249" y="4009200"/>
+            <a:ext cx="10064577" cy="851515"/>
+          </a:xfrm>
+          <a:prstGeom prst="rect">
+            <a:avLst/>
+          </a:prstGeom>
+          <a:noFill/>
+        </p:spPr>
+        <p:txBody>
+          <a:bodyPr wrap="square">
+            <a:spAutoFit/>
+          </a:bodyPr>
+          <a:lstStyle/>
+          <a:p>
+            <a:pPr>
+              <a:lnSpc>
+                <a:spcPts val="2000"/>
+              </a:lnSpc>
             </a:pPr>
             <a:r>
-              <a:rPr lang="en-US" dirty="0"/>
-              <a:t>This isn’t the end of the story…</a:t>
+              <a:rPr lang="en-US" sz="1400" dirty="0" err="1">
+                <a:latin typeface="Courier New" panose="02070309020205020404" pitchFamily="49" charset="0"/>
+                <a:cs typeface="Courier New" panose="02070309020205020404" pitchFamily="49" charset="0"/>
+              </a:rPr>
+              <a:t>sdss_url</a:t>
+            </a:r>
+            <a:r>
+              <a:rPr lang="en-US" sz="1400" dirty="0">
+                <a:latin typeface="Courier New" panose="02070309020205020404" pitchFamily="49" charset="0"/>
+                <a:cs typeface="Courier New" panose="02070309020205020404" pitchFamily="49" charset="0"/>
+              </a:rPr>
+              <a:t> = </a:t>
+            </a:r>
+            <a:r>
+              <a:rPr lang="en-US" sz="1400" dirty="0">
+                <a:latin typeface="Courier New" panose="02070309020205020404" pitchFamily="49" charset="0"/>
+                <a:cs typeface="Courier New" panose="02070309020205020404" pitchFamily="49" charset="0"/>
+                <a:hlinkClick r:id="rId4"/>
+              </a:rPr>
+              <a:t>http://skyserver.sdss.org/dr14/SkyServerWS/ImgCutout/getjpeg</a:t>
+            </a:r>
+            <a:endParaRPr lang="en-US" sz="1400" dirty="0">
+              <a:latin typeface="Courier New" panose="02070309020205020404" pitchFamily="49" charset="0"/>
+              <a:cs typeface="Courier New" panose="02070309020205020404" pitchFamily="49" charset="0"/>
+            </a:endParaRPr>
+          </a:p>
+          <a:p>
+            <a:pPr>
+              <a:lnSpc>
+                <a:spcPts val="2000"/>
+              </a:lnSpc>
+            </a:pPr>
+            <a:r>
+              <a:rPr lang="en-US" sz="1400" dirty="0" err="1">
+                <a:latin typeface="Courier New" panose="02070309020205020404" pitchFamily="49" charset="0"/>
+                <a:cs typeface="Courier New" panose="02070309020205020404" pitchFamily="49" charset="0"/>
+              </a:rPr>
+              <a:t>img_url</a:t>
+            </a:r>
+            <a:r>
+              <a:rPr lang="en-US" sz="1400" dirty="0">
+                <a:latin typeface="Courier New" panose="02070309020205020404" pitchFamily="49" charset="0"/>
+                <a:cs typeface="Courier New" panose="02070309020205020404" pitchFamily="49" charset="0"/>
+              </a:rPr>
+              <a:t> = </a:t>
+            </a:r>
+            <a:r>
+              <a:rPr lang="en-US" sz="1400" dirty="0" err="1">
+                <a:latin typeface="Courier New" panose="02070309020205020404" pitchFamily="49" charset="0"/>
+                <a:cs typeface="Courier New" panose="02070309020205020404" pitchFamily="49" charset="0"/>
+              </a:rPr>
+              <a:t>sdss_url</a:t>
+            </a:r>
+            <a:r>
+              <a:rPr lang="en-US" sz="1400" dirty="0">
+                <a:latin typeface="Courier New" panose="02070309020205020404" pitchFamily="49" charset="0"/>
+                <a:cs typeface="Courier New" panose="02070309020205020404" pitchFamily="49" charset="0"/>
+              </a:rPr>
+              <a:t> + f"?</a:t>
+            </a:r>
+            <a:r>
+              <a:rPr lang="en-US" sz="1400" dirty="0" err="1">
+                <a:latin typeface="Courier New" panose="02070309020205020404" pitchFamily="49" charset="0"/>
+                <a:cs typeface="Courier New" panose="02070309020205020404" pitchFamily="49" charset="0"/>
+              </a:rPr>
+              <a:t>ra</a:t>
+            </a:r>
+            <a:r>
+              <a:rPr lang="en-US" sz="1400" dirty="0">
+                <a:latin typeface="Courier New" panose="02070309020205020404" pitchFamily="49" charset="0"/>
+                <a:cs typeface="Courier New" panose="02070309020205020404" pitchFamily="49" charset="0"/>
+              </a:rPr>
+              <a:t>={ra:.5f}&amp;dec={dec:.5f}&amp;width={</a:t>
+            </a:r>
+            <a:r>
+              <a:rPr lang="en-US" sz="1400" dirty="0" err="1">
+                <a:latin typeface="Courier New" panose="02070309020205020404" pitchFamily="49" charset="0"/>
+                <a:cs typeface="Courier New" panose="02070309020205020404" pitchFamily="49" charset="0"/>
+              </a:rPr>
+              <a:t>jpeg_size</a:t>
+            </a:r>
+            <a:r>
+              <a:rPr lang="en-US" sz="1400" dirty="0">
+                <a:latin typeface="Courier New" panose="02070309020205020404" pitchFamily="49" charset="0"/>
+                <a:cs typeface="Courier New" panose="02070309020205020404" pitchFamily="49" charset="0"/>
+              </a:rPr>
+              <a:t>}&amp;height={</a:t>
+            </a:r>
+            <a:r>
+              <a:rPr lang="en-US" sz="1400" dirty="0" err="1">
+                <a:latin typeface="Courier New" panose="02070309020205020404" pitchFamily="49" charset="0"/>
+                <a:cs typeface="Courier New" panose="02070309020205020404" pitchFamily="49" charset="0"/>
+              </a:rPr>
+              <a:t>jpeg_size</a:t>
+            </a:r>
+            <a:r>
+              <a:rPr lang="en-US" sz="1400" dirty="0">
+                <a:latin typeface="Courier New" panose="02070309020205020404" pitchFamily="49" charset="0"/>
+                <a:cs typeface="Courier New" panose="02070309020205020404" pitchFamily="49" charset="0"/>
+              </a:rPr>
+              <a:t>}</a:t>
+            </a:r>
+          </a:p>
+          <a:p>
+            <a:pPr>
+              <a:lnSpc>
+                <a:spcPts val="2000"/>
+              </a:lnSpc>
+            </a:pPr>
+            <a:r>
+              <a:rPr lang="en-US" sz="1400" dirty="0" err="1">
+                <a:latin typeface="Courier New" panose="02070309020205020404" pitchFamily="49" charset="0"/>
+                <a:cs typeface="Courier New" panose="02070309020205020404" pitchFamily="49" charset="0"/>
+              </a:rPr>
+              <a:t>img_data</a:t>
+            </a:r>
+            <a:r>
+              <a:rPr lang="en-US" sz="1400" dirty="0">
+                <a:latin typeface="Courier New" panose="02070309020205020404" pitchFamily="49" charset="0"/>
+                <a:cs typeface="Courier New" panose="02070309020205020404" pitchFamily="49" charset="0"/>
+              </a:rPr>
+              <a:t> = </a:t>
+            </a:r>
+            <a:r>
+              <a:rPr lang="en-US" sz="1400" dirty="0" err="1">
+                <a:latin typeface="Courier New" panose="02070309020205020404" pitchFamily="49" charset="0"/>
+                <a:cs typeface="Courier New" panose="02070309020205020404" pitchFamily="49" charset="0"/>
+              </a:rPr>
+              <a:t>requests.get</a:t>
+            </a:r>
+            <a:r>
+              <a:rPr lang="en-US" sz="1400" dirty="0">
+                <a:latin typeface="Courier New" panose="02070309020205020404" pitchFamily="49" charset="0"/>
+                <a:cs typeface="Courier New" panose="02070309020205020404" pitchFamily="49" charset="0"/>
+              </a:rPr>
+              <a:t>(</a:t>
+            </a:r>
+            <a:r>
+              <a:rPr lang="en-US" sz="1400" dirty="0" err="1">
+                <a:latin typeface="Courier New" panose="02070309020205020404" pitchFamily="49" charset="0"/>
+                <a:cs typeface="Courier New" panose="02070309020205020404" pitchFamily="49" charset="0"/>
+              </a:rPr>
+              <a:t>img_url</a:t>
+            </a:r>
+            <a:r>
+              <a:rPr lang="en-US" sz="1400" dirty="0">
+                <a:latin typeface="Courier New" panose="02070309020205020404" pitchFamily="49" charset="0"/>
+                <a:cs typeface="Courier New" panose="02070309020205020404" pitchFamily="49" charset="0"/>
+              </a:rPr>
+              <a:t>).content</a:t>
             </a:r>
           </a:p>
         </p:txBody>

</xml_diff>